<commit_message>
1)Feature Importance 2)more statistics
</commit_message>
<xml_diff>
--- a/机器学习在医疗检测上的应用.pptx
+++ b/机器学习在医疗检测上的应用.pptx
@@ -5,20 +5,21 @@
     <p:sldMasterId id="2147483648" r:id="rId1"/>
   </p:sldMasterIdLst>
   <p:notesMasterIdLst>
-    <p:notesMasterId r:id="rId13"/>
+    <p:notesMasterId r:id="rId14"/>
   </p:notesMasterIdLst>
   <p:sldIdLst>
     <p:sldId id="259" r:id="rId2"/>
-    <p:sldId id="378" r:id="rId3"/>
-    <p:sldId id="380" r:id="rId4"/>
-    <p:sldId id="379" r:id="rId5"/>
-    <p:sldId id="382" r:id="rId6"/>
-    <p:sldId id="305" r:id="rId7"/>
-    <p:sldId id="371" r:id="rId8"/>
-    <p:sldId id="290" r:id="rId9"/>
-    <p:sldId id="377" r:id="rId10"/>
-    <p:sldId id="374" r:id="rId11"/>
-    <p:sldId id="376" r:id="rId12"/>
+    <p:sldId id="383" r:id="rId3"/>
+    <p:sldId id="387" r:id="rId4"/>
+    <p:sldId id="386" r:id="rId5"/>
+    <p:sldId id="384" r:id="rId6"/>
+    <p:sldId id="385" r:id="rId7"/>
+    <p:sldId id="305" r:id="rId8"/>
+    <p:sldId id="371" r:id="rId9"/>
+    <p:sldId id="290" r:id="rId10"/>
+    <p:sldId id="377" r:id="rId11"/>
+    <p:sldId id="374" r:id="rId12"/>
+    <p:sldId id="376" r:id="rId13"/>
   </p:sldIdLst>
   <p:sldSz cx="12192000" cy="6858000"/>
   <p:notesSz cx="6858000" cy="9144000"/>
@@ -207,7 +208,7 @@
           <a:p>
             <a:fld id="{A078CFF5-23CF-4917-B683-DA0BA79D6829}" type="datetimeFigureOut">
               <a:rPr lang="zh-CN" altLang="en-US" smtClean="0"/>
-              <a:t>2019/7/1</a:t>
+              <a:t>2019/7/4</a:t>
             </a:fld>
             <a:endParaRPr lang="zh-CN" altLang="en-US"/>
           </a:p>
@@ -939,7 +940,7 @@
           <p:cNvPr id="2" name="标题 1">
             <a:extLst>
               <a:ext uri="{FF2B5EF4-FFF2-40B4-BE49-F238E27FC236}">
-                <a16:creationId xmlns:a16="http://schemas.microsoft.com/office/drawing/2014/main" xmlns="" id="{E580FC44-32D5-40A4-9DCB-2953285DEDE9}"/>
+                <a16:creationId xmlns="" xmlns:a16="http://schemas.microsoft.com/office/drawing/2014/main" id="{E580FC44-32D5-40A4-9DCB-2953285DEDE9}"/>
               </a:ext>
             </a:extLst>
           </p:cNvPr>
@@ -976,7 +977,7 @@
           <p:cNvPr id="3" name="副标题 2">
             <a:extLst>
               <a:ext uri="{FF2B5EF4-FFF2-40B4-BE49-F238E27FC236}">
-                <a16:creationId xmlns:a16="http://schemas.microsoft.com/office/drawing/2014/main" xmlns="" id="{5F894D9A-7DEA-483E-B08E-3E4E63458A51}"/>
+                <a16:creationId xmlns="" xmlns:a16="http://schemas.microsoft.com/office/drawing/2014/main" id="{5F894D9A-7DEA-483E-B08E-3E4E63458A51}"/>
               </a:ext>
             </a:extLst>
           </p:cNvPr>
@@ -1046,7 +1047,7 @@
           <p:cNvPr id="4" name="日期占位符 3">
             <a:extLst>
               <a:ext uri="{FF2B5EF4-FFF2-40B4-BE49-F238E27FC236}">
-                <a16:creationId xmlns:a16="http://schemas.microsoft.com/office/drawing/2014/main" xmlns="" id="{618ADD48-259D-451C-AF56-5D4AD57C702C}"/>
+                <a16:creationId xmlns="" xmlns:a16="http://schemas.microsoft.com/office/drawing/2014/main" id="{618ADD48-259D-451C-AF56-5D4AD57C702C}"/>
               </a:ext>
             </a:extLst>
           </p:cNvPr>
@@ -1064,7 +1065,7 @@
           <a:p>
             <a:fld id="{ECB3A450-DB7F-4EB3-91CC-C8B58F538803}" type="datetimeFigureOut">
               <a:rPr lang="zh-CN" altLang="en-US" smtClean="0"/>
-              <a:t>2019/7/1</a:t>
+              <a:t>2019/7/4</a:t>
             </a:fld>
             <a:endParaRPr lang="zh-CN" altLang="en-US"/>
           </a:p>
@@ -1075,7 +1076,7 @@
           <p:cNvPr id="5" name="页脚占位符 4">
             <a:extLst>
               <a:ext uri="{FF2B5EF4-FFF2-40B4-BE49-F238E27FC236}">
-                <a16:creationId xmlns:a16="http://schemas.microsoft.com/office/drawing/2014/main" xmlns="" id="{6A3802E7-D5B4-4A01-85A6-47EFBC5BAED0}"/>
+                <a16:creationId xmlns="" xmlns:a16="http://schemas.microsoft.com/office/drawing/2014/main" id="{6A3802E7-D5B4-4A01-85A6-47EFBC5BAED0}"/>
               </a:ext>
             </a:extLst>
           </p:cNvPr>
@@ -1100,7 +1101,7 @@
           <p:cNvPr id="6" name="灯片编号占位符 5">
             <a:extLst>
               <a:ext uri="{FF2B5EF4-FFF2-40B4-BE49-F238E27FC236}">
-                <a16:creationId xmlns:a16="http://schemas.microsoft.com/office/drawing/2014/main" xmlns="" id="{D791BB88-879C-41AD-BDAE-B0B2B91A3D25}"/>
+                <a16:creationId xmlns="" xmlns:a16="http://schemas.microsoft.com/office/drawing/2014/main" id="{D791BB88-879C-41AD-BDAE-B0B2B91A3D25}"/>
               </a:ext>
             </a:extLst>
           </p:cNvPr>
@@ -1159,7 +1160,7 @@
           <p:cNvPr id="2" name="标题 1">
             <a:extLst>
               <a:ext uri="{FF2B5EF4-FFF2-40B4-BE49-F238E27FC236}">
-                <a16:creationId xmlns:a16="http://schemas.microsoft.com/office/drawing/2014/main" xmlns="" id="{D64BDE29-65D6-45A9-AFF3-E0171E16F6C0}"/>
+                <a16:creationId xmlns="" xmlns:a16="http://schemas.microsoft.com/office/drawing/2014/main" id="{D64BDE29-65D6-45A9-AFF3-E0171E16F6C0}"/>
               </a:ext>
             </a:extLst>
           </p:cNvPr>
@@ -1187,7 +1188,7 @@
           <p:cNvPr id="3" name="竖排文字占位符 2">
             <a:extLst>
               <a:ext uri="{FF2B5EF4-FFF2-40B4-BE49-F238E27FC236}">
-                <a16:creationId xmlns:a16="http://schemas.microsoft.com/office/drawing/2014/main" xmlns="" id="{E743D4A9-E91D-4FB7-ACB1-CC7F5E0D4BCC}"/>
+                <a16:creationId xmlns="" xmlns:a16="http://schemas.microsoft.com/office/drawing/2014/main" id="{E743D4A9-E91D-4FB7-ACB1-CC7F5E0D4BCC}"/>
               </a:ext>
             </a:extLst>
           </p:cNvPr>
@@ -1244,7 +1245,7 @@
           <p:cNvPr id="4" name="日期占位符 3">
             <a:extLst>
               <a:ext uri="{FF2B5EF4-FFF2-40B4-BE49-F238E27FC236}">
-                <a16:creationId xmlns:a16="http://schemas.microsoft.com/office/drawing/2014/main" xmlns="" id="{D7ECB507-35E5-4A02-BB2C-287E35EAE657}"/>
+                <a16:creationId xmlns="" xmlns:a16="http://schemas.microsoft.com/office/drawing/2014/main" id="{D7ECB507-35E5-4A02-BB2C-287E35EAE657}"/>
               </a:ext>
             </a:extLst>
           </p:cNvPr>
@@ -1262,7 +1263,7 @@
           <a:p>
             <a:fld id="{ECB3A450-DB7F-4EB3-91CC-C8B58F538803}" type="datetimeFigureOut">
               <a:rPr lang="zh-CN" altLang="en-US" smtClean="0"/>
-              <a:t>2019/7/1</a:t>
+              <a:t>2019/7/4</a:t>
             </a:fld>
             <a:endParaRPr lang="zh-CN" altLang="en-US"/>
           </a:p>
@@ -1273,7 +1274,7 @@
           <p:cNvPr id="5" name="页脚占位符 4">
             <a:extLst>
               <a:ext uri="{FF2B5EF4-FFF2-40B4-BE49-F238E27FC236}">
-                <a16:creationId xmlns:a16="http://schemas.microsoft.com/office/drawing/2014/main" xmlns="" id="{90749697-E0A1-4720-9A2D-81C0C311C5A8}"/>
+                <a16:creationId xmlns="" xmlns:a16="http://schemas.microsoft.com/office/drawing/2014/main" id="{90749697-E0A1-4720-9A2D-81C0C311C5A8}"/>
               </a:ext>
             </a:extLst>
           </p:cNvPr>
@@ -1298,7 +1299,7 @@
           <p:cNvPr id="6" name="灯片编号占位符 5">
             <a:extLst>
               <a:ext uri="{FF2B5EF4-FFF2-40B4-BE49-F238E27FC236}">
-                <a16:creationId xmlns:a16="http://schemas.microsoft.com/office/drawing/2014/main" xmlns="" id="{7506FF4D-6C85-4054-85C9-7C48506E4D30}"/>
+                <a16:creationId xmlns="" xmlns:a16="http://schemas.microsoft.com/office/drawing/2014/main" id="{7506FF4D-6C85-4054-85C9-7C48506E4D30}"/>
               </a:ext>
             </a:extLst>
           </p:cNvPr>
@@ -1357,7 +1358,7 @@
           <p:cNvPr id="2" name="竖排标题 1">
             <a:extLst>
               <a:ext uri="{FF2B5EF4-FFF2-40B4-BE49-F238E27FC236}">
-                <a16:creationId xmlns:a16="http://schemas.microsoft.com/office/drawing/2014/main" xmlns="" id="{B5D8404F-551E-4C1C-8178-207D8186048E}"/>
+                <a16:creationId xmlns="" xmlns:a16="http://schemas.microsoft.com/office/drawing/2014/main" id="{B5D8404F-551E-4C1C-8178-207D8186048E}"/>
               </a:ext>
             </a:extLst>
           </p:cNvPr>
@@ -1390,7 +1391,7 @@
           <p:cNvPr id="3" name="竖排文字占位符 2">
             <a:extLst>
               <a:ext uri="{FF2B5EF4-FFF2-40B4-BE49-F238E27FC236}">
-                <a16:creationId xmlns:a16="http://schemas.microsoft.com/office/drawing/2014/main" xmlns="" id="{C8B24A8E-4FE9-4623-974A-07621A21258F}"/>
+                <a16:creationId xmlns="" xmlns:a16="http://schemas.microsoft.com/office/drawing/2014/main" id="{C8B24A8E-4FE9-4623-974A-07621A21258F}"/>
               </a:ext>
             </a:extLst>
           </p:cNvPr>
@@ -1452,7 +1453,7 @@
           <p:cNvPr id="4" name="日期占位符 3">
             <a:extLst>
               <a:ext uri="{FF2B5EF4-FFF2-40B4-BE49-F238E27FC236}">
-                <a16:creationId xmlns:a16="http://schemas.microsoft.com/office/drawing/2014/main" xmlns="" id="{BB2741E6-5A35-4F1E-B412-473046404DF2}"/>
+                <a16:creationId xmlns="" xmlns:a16="http://schemas.microsoft.com/office/drawing/2014/main" id="{BB2741E6-5A35-4F1E-B412-473046404DF2}"/>
               </a:ext>
             </a:extLst>
           </p:cNvPr>
@@ -1470,7 +1471,7 @@
           <a:p>
             <a:fld id="{ECB3A450-DB7F-4EB3-91CC-C8B58F538803}" type="datetimeFigureOut">
               <a:rPr lang="zh-CN" altLang="en-US" smtClean="0"/>
-              <a:t>2019/7/1</a:t>
+              <a:t>2019/7/4</a:t>
             </a:fld>
             <a:endParaRPr lang="zh-CN" altLang="en-US"/>
           </a:p>
@@ -1481,7 +1482,7 @@
           <p:cNvPr id="5" name="页脚占位符 4">
             <a:extLst>
               <a:ext uri="{FF2B5EF4-FFF2-40B4-BE49-F238E27FC236}">
-                <a16:creationId xmlns:a16="http://schemas.microsoft.com/office/drawing/2014/main" xmlns="" id="{018B3F31-82F6-4537-900E-D810040E8E0B}"/>
+                <a16:creationId xmlns="" xmlns:a16="http://schemas.microsoft.com/office/drawing/2014/main" id="{018B3F31-82F6-4537-900E-D810040E8E0B}"/>
               </a:ext>
             </a:extLst>
           </p:cNvPr>
@@ -1506,7 +1507,7 @@
           <p:cNvPr id="6" name="灯片编号占位符 5">
             <a:extLst>
               <a:ext uri="{FF2B5EF4-FFF2-40B4-BE49-F238E27FC236}">
-                <a16:creationId xmlns:a16="http://schemas.microsoft.com/office/drawing/2014/main" xmlns="" id="{9E8FE980-EBEC-4218-B38C-8E26BD7A5F19}"/>
+                <a16:creationId xmlns="" xmlns:a16="http://schemas.microsoft.com/office/drawing/2014/main" id="{9E8FE980-EBEC-4218-B38C-8E26BD7A5F19}"/>
               </a:ext>
             </a:extLst>
           </p:cNvPr>
@@ -1661,7 +1662,7 @@
               <a:pPr>
                 <a:defRPr/>
               </a:pPr>
-              <a:t>7/1/2019</a:t>
+              <a:t>7/4/2019</a:t>
             </a:fld>
             <a:endParaRPr altLang="en-US"/>
           </a:p>
@@ -2195,7 +2196,7 @@
           <p:cNvPr id="2" name="标题 1">
             <a:extLst>
               <a:ext uri="{FF2B5EF4-FFF2-40B4-BE49-F238E27FC236}">
-                <a16:creationId xmlns:a16="http://schemas.microsoft.com/office/drawing/2014/main" xmlns="" id="{51BDBC93-79A8-4A53-8177-67F01D9C67E9}"/>
+                <a16:creationId xmlns="" xmlns:a16="http://schemas.microsoft.com/office/drawing/2014/main" id="{51BDBC93-79A8-4A53-8177-67F01D9C67E9}"/>
               </a:ext>
             </a:extLst>
           </p:cNvPr>
@@ -2223,7 +2224,7 @@
           <p:cNvPr id="3" name="内容占位符 2">
             <a:extLst>
               <a:ext uri="{FF2B5EF4-FFF2-40B4-BE49-F238E27FC236}">
-                <a16:creationId xmlns:a16="http://schemas.microsoft.com/office/drawing/2014/main" xmlns="" id="{262FF84D-B976-40EE-8E3F-9133C7775E5E}"/>
+                <a16:creationId xmlns="" xmlns:a16="http://schemas.microsoft.com/office/drawing/2014/main" id="{262FF84D-B976-40EE-8E3F-9133C7775E5E}"/>
               </a:ext>
             </a:extLst>
           </p:cNvPr>
@@ -2280,7 +2281,7 @@
           <p:cNvPr id="4" name="日期占位符 3">
             <a:extLst>
               <a:ext uri="{FF2B5EF4-FFF2-40B4-BE49-F238E27FC236}">
-                <a16:creationId xmlns:a16="http://schemas.microsoft.com/office/drawing/2014/main" xmlns="" id="{5D6481E2-7785-4A82-9435-BE47EA805FAF}"/>
+                <a16:creationId xmlns="" xmlns:a16="http://schemas.microsoft.com/office/drawing/2014/main" id="{5D6481E2-7785-4A82-9435-BE47EA805FAF}"/>
               </a:ext>
             </a:extLst>
           </p:cNvPr>
@@ -2298,7 +2299,7 @@
           <a:p>
             <a:fld id="{ECB3A450-DB7F-4EB3-91CC-C8B58F538803}" type="datetimeFigureOut">
               <a:rPr lang="zh-CN" altLang="en-US" smtClean="0"/>
-              <a:t>2019/7/1</a:t>
+              <a:t>2019/7/4</a:t>
             </a:fld>
             <a:endParaRPr lang="zh-CN" altLang="en-US"/>
           </a:p>
@@ -2309,7 +2310,7 @@
           <p:cNvPr id="5" name="页脚占位符 4">
             <a:extLst>
               <a:ext uri="{FF2B5EF4-FFF2-40B4-BE49-F238E27FC236}">
-                <a16:creationId xmlns:a16="http://schemas.microsoft.com/office/drawing/2014/main" xmlns="" id="{3985B5BC-BC14-4426-93DC-3B5BA6082893}"/>
+                <a16:creationId xmlns="" xmlns:a16="http://schemas.microsoft.com/office/drawing/2014/main" id="{3985B5BC-BC14-4426-93DC-3B5BA6082893}"/>
               </a:ext>
             </a:extLst>
           </p:cNvPr>
@@ -2334,7 +2335,7 @@
           <p:cNvPr id="6" name="灯片编号占位符 5">
             <a:extLst>
               <a:ext uri="{FF2B5EF4-FFF2-40B4-BE49-F238E27FC236}">
-                <a16:creationId xmlns:a16="http://schemas.microsoft.com/office/drawing/2014/main" xmlns="" id="{A0FDC777-4EB0-4290-BA5E-0933E43E87BA}"/>
+                <a16:creationId xmlns="" xmlns:a16="http://schemas.microsoft.com/office/drawing/2014/main" id="{A0FDC777-4EB0-4290-BA5E-0933E43E87BA}"/>
               </a:ext>
             </a:extLst>
           </p:cNvPr>
@@ -2393,7 +2394,7 @@
           <p:cNvPr id="2" name="标题 1">
             <a:extLst>
               <a:ext uri="{FF2B5EF4-FFF2-40B4-BE49-F238E27FC236}">
-                <a16:creationId xmlns:a16="http://schemas.microsoft.com/office/drawing/2014/main" xmlns="" id="{42C9C9D8-9560-4348-96D7-5CF95E808698}"/>
+                <a16:creationId xmlns="" xmlns:a16="http://schemas.microsoft.com/office/drawing/2014/main" id="{42C9C9D8-9560-4348-96D7-5CF95E808698}"/>
               </a:ext>
             </a:extLst>
           </p:cNvPr>
@@ -2430,7 +2431,7 @@
           <p:cNvPr id="3" name="文本占位符 2">
             <a:extLst>
               <a:ext uri="{FF2B5EF4-FFF2-40B4-BE49-F238E27FC236}">
-                <a16:creationId xmlns:a16="http://schemas.microsoft.com/office/drawing/2014/main" xmlns="" id="{31B6CC81-40BD-4C58-A482-A50F5AD9F08B}"/>
+                <a16:creationId xmlns="" xmlns:a16="http://schemas.microsoft.com/office/drawing/2014/main" id="{31B6CC81-40BD-4C58-A482-A50F5AD9F08B}"/>
               </a:ext>
             </a:extLst>
           </p:cNvPr>
@@ -2555,7 +2556,7 @@
           <p:cNvPr id="4" name="日期占位符 3">
             <a:extLst>
               <a:ext uri="{FF2B5EF4-FFF2-40B4-BE49-F238E27FC236}">
-                <a16:creationId xmlns:a16="http://schemas.microsoft.com/office/drawing/2014/main" xmlns="" id="{F83C9B25-FAEB-4D16-8793-C01A7A2E66E2}"/>
+                <a16:creationId xmlns="" xmlns:a16="http://schemas.microsoft.com/office/drawing/2014/main" id="{F83C9B25-FAEB-4D16-8793-C01A7A2E66E2}"/>
               </a:ext>
             </a:extLst>
           </p:cNvPr>
@@ -2573,7 +2574,7 @@
           <a:p>
             <a:fld id="{ECB3A450-DB7F-4EB3-91CC-C8B58F538803}" type="datetimeFigureOut">
               <a:rPr lang="zh-CN" altLang="en-US" smtClean="0"/>
-              <a:t>2019/7/1</a:t>
+              <a:t>2019/7/4</a:t>
             </a:fld>
             <a:endParaRPr lang="zh-CN" altLang="en-US"/>
           </a:p>
@@ -2584,7 +2585,7 @@
           <p:cNvPr id="5" name="页脚占位符 4">
             <a:extLst>
               <a:ext uri="{FF2B5EF4-FFF2-40B4-BE49-F238E27FC236}">
-                <a16:creationId xmlns:a16="http://schemas.microsoft.com/office/drawing/2014/main" xmlns="" id="{D3C536D4-6AD3-440C-AF3F-4D8ADDE8145C}"/>
+                <a16:creationId xmlns="" xmlns:a16="http://schemas.microsoft.com/office/drawing/2014/main" id="{D3C536D4-6AD3-440C-AF3F-4D8ADDE8145C}"/>
               </a:ext>
             </a:extLst>
           </p:cNvPr>
@@ -2609,7 +2610,7 @@
           <p:cNvPr id="6" name="灯片编号占位符 5">
             <a:extLst>
               <a:ext uri="{FF2B5EF4-FFF2-40B4-BE49-F238E27FC236}">
-                <a16:creationId xmlns:a16="http://schemas.microsoft.com/office/drawing/2014/main" xmlns="" id="{B7417C79-812F-458B-B0EA-323AFF8CFD4A}"/>
+                <a16:creationId xmlns="" xmlns:a16="http://schemas.microsoft.com/office/drawing/2014/main" id="{B7417C79-812F-458B-B0EA-323AFF8CFD4A}"/>
               </a:ext>
             </a:extLst>
           </p:cNvPr>
@@ -2668,7 +2669,7 @@
           <p:cNvPr id="2" name="标题 1">
             <a:extLst>
               <a:ext uri="{FF2B5EF4-FFF2-40B4-BE49-F238E27FC236}">
-                <a16:creationId xmlns:a16="http://schemas.microsoft.com/office/drawing/2014/main" xmlns="" id="{4AD0759B-E894-4A16-9A35-1E34F7CF7313}"/>
+                <a16:creationId xmlns="" xmlns:a16="http://schemas.microsoft.com/office/drawing/2014/main" id="{4AD0759B-E894-4A16-9A35-1E34F7CF7313}"/>
               </a:ext>
             </a:extLst>
           </p:cNvPr>
@@ -2696,7 +2697,7 @@
           <p:cNvPr id="3" name="内容占位符 2">
             <a:extLst>
               <a:ext uri="{FF2B5EF4-FFF2-40B4-BE49-F238E27FC236}">
-                <a16:creationId xmlns:a16="http://schemas.microsoft.com/office/drawing/2014/main" xmlns="" id="{D50D5977-C8E4-49DC-BCA4-0B3D396C9E79}"/>
+                <a16:creationId xmlns="" xmlns:a16="http://schemas.microsoft.com/office/drawing/2014/main" id="{D50D5977-C8E4-49DC-BCA4-0B3D396C9E79}"/>
               </a:ext>
             </a:extLst>
           </p:cNvPr>
@@ -2758,7 +2759,7 @@
           <p:cNvPr id="4" name="内容占位符 3">
             <a:extLst>
               <a:ext uri="{FF2B5EF4-FFF2-40B4-BE49-F238E27FC236}">
-                <a16:creationId xmlns:a16="http://schemas.microsoft.com/office/drawing/2014/main" xmlns="" id="{0089898B-F3A3-43C9-9042-7E00B1F47095}"/>
+                <a16:creationId xmlns="" xmlns:a16="http://schemas.microsoft.com/office/drawing/2014/main" id="{0089898B-F3A3-43C9-9042-7E00B1F47095}"/>
               </a:ext>
             </a:extLst>
           </p:cNvPr>
@@ -2820,7 +2821,7 @@
           <p:cNvPr id="5" name="日期占位符 4">
             <a:extLst>
               <a:ext uri="{FF2B5EF4-FFF2-40B4-BE49-F238E27FC236}">
-                <a16:creationId xmlns:a16="http://schemas.microsoft.com/office/drawing/2014/main" xmlns="" id="{62C19CD6-0440-4DB8-ABB4-61E365782678}"/>
+                <a16:creationId xmlns="" xmlns:a16="http://schemas.microsoft.com/office/drawing/2014/main" id="{62C19CD6-0440-4DB8-ABB4-61E365782678}"/>
               </a:ext>
             </a:extLst>
           </p:cNvPr>
@@ -2838,7 +2839,7 @@
           <a:p>
             <a:fld id="{ECB3A450-DB7F-4EB3-91CC-C8B58F538803}" type="datetimeFigureOut">
               <a:rPr lang="zh-CN" altLang="en-US" smtClean="0"/>
-              <a:t>2019/7/1</a:t>
+              <a:t>2019/7/4</a:t>
             </a:fld>
             <a:endParaRPr lang="zh-CN" altLang="en-US"/>
           </a:p>
@@ -2849,7 +2850,7 @@
           <p:cNvPr id="6" name="页脚占位符 5">
             <a:extLst>
               <a:ext uri="{FF2B5EF4-FFF2-40B4-BE49-F238E27FC236}">
-                <a16:creationId xmlns:a16="http://schemas.microsoft.com/office/drawing/2014/main" xmlns="" id="{3165DA44-068E-4FF2-A8E3-91976EFE8307}"/>
+                <a16:creationId xmlns="" xmlns:a16="http://schemas.microsoft.com/office/drawing/2014/main" id="{3165DA44-068E-4FF2-A8E3-91976EFE8307}"/>
               </a:ext>
             </a:extLst>
           </p:cNvPr>
@@ -2874,7 +2875,7 @@
           <p:cNvPr id="7" name="灯片编号占位符 6">
             <a:extLst>
               <a:ext uri="{FF2B5EF4-FFF2-40B4-BE49-F238E27FC236}">
-                <a16:creationId xmlns:a16="http://schemas.microsoft.com/office/drawing/2014/main" xmlns="" id="{C2F854B2-799E-4D42-AEF0-42EDEDA8BC3E}"/>
+                <a16:creationId xmlns="" xmlns:a16="http://schemas.microsoft.com/office/drawing/2014/main" id="{C2F854B2-799E-4D42-AEF0-42EDEDA8BC3E}"/>
               </a:ext>
             </a:extLst>
           </p:cNvPr>
@@ -2933,7 +2934,7 @@
           <p:cNvPr id="2" name="标题 1">
             <a:extLst>
               <a:ext uri="{FF2B5EF4-FFF2-40B4-BE49-F238E27FC236}">
-                <a16:creationId xmlns:a16="http://schemas.microsoft.com/office/drawing/2014/main" xmlns="" id="{9CA379B8-F61D-4B94-BF9A-BBE35F4FB7F2}"/>
+                <a16:creationId xmlns="" xmlns:a16="http://schemas.microsoft.com/office/drawing/2014/main" id="{9CA379B8-F61D-4B94-BF9A-BBE35F4FB7F2}"/>
               </a:ext>
             </a:extLst>
           </p:cNvPr>
@@ -2966,7 +2967,7 @@
           <p:cNvPr id="3" name="文本占位符 2">
             <a:extLst>
               <a:ext uri="{FF2B5EF4-FFF2-40B4-BE49-F238E27FC236}">
-                <a16:creationId xmlns:a16="http://schemas.microsoft.com/office/drawing/2014/main" xmlns="" id="{08BAE3CE-D82F-43E9-8927-96AB4DBF414B}"/>
+                <a16:creationId xmlns="" xmlns:a16="http://schemas.microsoft.com/office/drawing/2014/main" id="{08BAE3CE-D82F-43E9-8927-96AB4DBF414B}"/>
               </a:ext>
             </a:extLst>
           </p:cNvPr>
@@ -3037,7 +3038,7 @@
           <p:cNvPr id="4" name="内容占位符 3">
             <a:extLst>
               <a:ext uri="{FF2B5EF4-FFF2-40B4-BE49-F238E27FC236}">
-                <a16:creationId xmlns:a16="http://schemas.microsoft.com/office/drawing/2014/main" xmlns="" id="{537B943D-16DC-4EA2-8B47-96C32400550E}"/>
+                <a16:creationId xmlns="" xmlns:a16="http://schemas.microsoft.com/office/drawing/2014/main" id="{537B943D-16DC-4EA2-8B47-96C32400550E}"/>
               </a:ext>
             </a:extLst>
           </p:cNvPr>
@@ -3099,7 +3100,7 @@
           <p:cNvPr id="5" name="文本占位符 4">
             <a:extLst>
               <a:ext uri="{FF2B5EF4-FFF2-40B4-BE49-F238E27FC236}">
-                <a16:creationId xmlns:a16="http://schemas.microsoft.com/office/drawing/2014/main" xmlns="" id="{EAE82B89-4566-40EE-9506-FA0D441D6E50}"/>
+                <a16:creationId xmlns="" xmlns:a16="http://schemas.microsoft.com/office/drawing/2014/main" id="{EAE82B89-4566-40EE-9506-FA0D441D6E50}"/>
               </a:ext>
             </a:extLst>
           </p:cNvPr>
@@ -3170,7 +3171,7 @@
           <p:cNvPr id="6" name="内容占位符 5">
             <a:extLst>
               <a:ext uri="{FF2B5EF4-FFF2-40B4-BE49-F238E27FC236}">
-                <a16:creationId xmlns:a16="http://schemas.microsoft.com/office/drawing/2014/main" xmlns="" id="{5A9A0729-49A5-4DAE-9F84-B1F0A5F0E6D7}"/>
+                <a16:creationId xmlns="" xmlns:a16="http://schemas.microsoft.com/office/drawing/2014/main" id="{5A9A0729-49A5-4DAE-9F84-B1F0A5F0E6D7}"/>
               </a:ext>
             </a:extLst>
           </p:cNvPr>
@@ -3232,7 +3233,7 @@
           <p:cNvPr id="7" name="日期占位符 6">
             <a:extLst>
               <a:ext uri="{FF2B5EF4-FFF2-40B4-BE49-F238E27FC236}">
-                <a16:creationId xmlns:a16="http://schemas.microsoft.com/office/drawing/2014/main" xmlns="" id="{2678D495-C018-4217-9D4D-52230FCF2C42}"/>
+                <a16:creationId xmlns="" xmlns:a16="http://schemas.microsoft.com/office/drawing/2014/main" id="{2678D495-C018-4217-9D4D-52230FCF2C42}"/>
               </a:ext>
             </a:extLst>
           </p:cNvPr>
@@ -3250,7 +3251,7 @@
           <a:p>
             <a:fld id="{ECB3A450-DB7F-4EB3-91CC-C8B58F538803}" type="datetimeFigureOut">
               <a:rPr lang="zh-CN" altLang="en-US" smtClean="0"/>
-              <a:t>2019/7/1</a:t>
+              <a:t>2019/7/4</a:t>
             </a:fld>
             <a:endParaRPr lang="zh-CN" altLang="en-US"/>
           </a:p>
@@ -3261,7 +3262,7 @@
           <p:cNvPr id="8" name="页脚占位符 7">
             <a:extLst>
               <a:ext uri="{FF2B5EF4-FFF2-40B4-BE49-F238E27FC236}">
-                <a16:creationId xmlns:a16="http://schemas.microsoft.com/office/drawing/2014/main" xmlns="" id="{F947E2F3-A288-488F-9563-CB60BE45E1F9}"/>
+                <a16:creationId xmlns="" xmlns:a16="http://schemas.microsoft.com/office/drawing/2014/main" id="{F947E2F3-A288-488F-9563-CB60BE45E1F9}"/>
               </a:ext>
             </a:extLst>
           </p:cNvPr>
@@ -3286,7 +3287,7 @@
           <p:cNvPr id="9" name="灯片编号占位符 8">
             <a:extLst>
               <a:ext uri="{FF2B5EF4-FFF2-40B4-BE49-F238E27FC236}">
-                <a16:creationId xmlns:a16="http://schemas.microsoft.com/office/drawing/2014/main" xmlns="" id="{0AE39A90-DE4C-468B-8481-0FA21D9BB0F8}"/>
+                <a16:creationId xmlns="" xmlns:a16="http://schemas.microsoft.com/office/drawing/2014/main" id="{0AE39A90-DE4C-468B-8481-0FA21D9BB0F8}"/>
               </a:ext>
             </a:extLst>
           </p:cNvPr>
@@ -3345,7 +3346,7 @@
           <p:cNvPr id="2" name="标题 1">
             <a:extLst>
               <a:ext uri="{FF2B5EF4-FFF2-40B4-BE49-F238E27FC236}">
-                <a16:creationId xmlns:a16="http://schemas.microsoft.com/office/drawing/2014/main" xmlns="" id="{48787E15-47FF-444F-879E-2F088593F18E}"/>
+                <a16:creationId xmlns="" xmlns:a16="http://schemas.microsoft.com/office/drawing/2014/main" id="{48787E15-47FF-444F-879E-2F088593F18E}"/>
               </a:ext>
             </a:extLst>
           </p:cNvPr>
@@ -3373,7 +3374,7 @@
           <p:cNvPr id="3" name="日期占位符 2">
             <a:extLst>
               <a:ext uri="{FF2B5EF4-FFF2-40B4-BE49-F238E27FC236}">
-                <a16:creationId xmlns:a16="http://schemas.microsoft.com/office/drawing/2014/main" xmlns="" id="{3A37ADED-DFA0-4E93-B886-C8F8913F912A}"/>
+                <a16:creationId xmlns="" xmlns:a16="http://schemas.microsoft.com/office/drawing/2014/main" id="{3A37ADED-DFA0-4E93-B886-C8F8913F912A}"/>
               </a:ext>
             </a:extLst>
           </p:cNvPr>
@@ -3391,7 +3392,7 @@
           <a:p>
             <a:fld id="{ECB3A450-DB7F-4EB3-91CC-C8B58F538803}" type="datetimeFigureOut">
               <a:rPr lang="zh-CN" altLang="en-US" smtClean="0"/>
-              <a:t>2019/7/1</a:t>
+              <a:t>2019/7/4</a:t>
             </a:fld>
             <a:endParaRPr lang="zh-CN" altLang="en-US"/>
           </a:p>
@@ -3402,7 +3403,7 @@
           <p:cNvPr id="4" name="页脚占位符 3">
             <a:extLst>
               <a:ext uri="{FF2B5EF4-FFF2-40B4-BE49-F238E27FC236}">
-                <a16:creationId xmlns:a16="http://schemas.microsoft.com/office/drawing/2014/main" xmlns="" id="{70F3A4B2-08CB-4504-85DD-47AA1E0FBDD8}"/>
+                <a16:creationId xmlns="" xmlns:a16="http://schemas.microsoft.com/office/drawing/2014/main" id="{70F3A4B2-08CB-4504-85DD-47AA1E0FBDD8}"/>
               </a:ext>
             </a:extLst>
           </p:cNvPr>
@@ -3427,7 +3428,7 @@
           <p:cNvPr id="5" name="灯片编号占位符 4">
             <a:extLst>
               <a:ext uri="{FF2B5EF4-FFF2-40B4-BE49-F238E27FC236}">
-                <a16:creationId xmlns:a16="http://schemas.microsoft.com/office/drawing/2014/main" xmlns="" id="{74C555D7-D59A-4E77-B882-E348B32D5046}"/>
+                <a16:creationId xmlns="" xmlns:a16="http://schemas.microsoft.com/office/drawing/2014/main" id="{74C555D7-D59A-4E77-B882-E348B32D5046}"/>
               </a:ext>
             </a:extLst>
           </p:cNvPr>
@@ -3486,7 +3487,7 @@
           <p:cNvPr id="2" name="日期占位符 1">
             <a:extLst>
               <a:ext uri="{FF2B5EF4-FFF2-40B4-BE49-F238E27FC236}">
-                <a16:creationId xmlns:a16="http://schemas.microsoft.com/office/drawing/2014/main" xmlns="" id="{9D034F36-1C49-4660-83BA-C2F30B97E167}"/>
+                <a16:creationId xmlns="" xmlns:a16="http://schemas.microsoft.com/office/drawing/2014/main" id="{9D034F36-1C49-4660-83BA-C2F30B97E167}"/>
               </a:ext>
             </a:extLst>
           </p:cNvPr>
@@ -3504,7 +3505,7 @@
           <a:p>
             <a:fld id="{ECB3A450-DB7F-4EB3-91CC-C8B58F538803}" type="datetimeFigureOut">
               <a:rPr lang="zh-CN" altLang="en-US" smtClean="0"/>
-              <a:t>2019/7/1</a:t>
+              <a:t>2019/7/4</a:t>
             </a:fld>
             <a:endParaRPr lang="zh-CN" altLang="en-US"/>
           </a:p>
@@ -3515,7 +3516,7 @@
           <p:cNvPr id="3" name="页脚占位符 2">
             <a:extLst>
               <a:ext uri="{FF2B5EF4-FFF2-40B4-BE49-F238E27FC236}">
-                <a16:creationId xmlns:a16="http://schemas.microsoft.com/office/drawing/2014/main" xmlns="" id="{0DD71789-4D78-447C-B85F-72FD1F60BE5E}"/>
+                <a16:creationId xmlns="" xmlns:a16="http://schemas.microsoft.com/office/drawing/2014/main" id="{0DD71789-4D78-447C-B85F-72FD1F60BE5E}"/>
               </a:ext>
             </a:extLst>
           </p:cNvPr>
@@ -3540,7 +3541,7 @@
           <p:cNvPr id="4" name="灯片编号占位符 3">
             <a:extLst>
               <a:ext uri="{FF2B5EF4-FFF2-40B4-BE49-F238E27FC236}">
-                <a16:creationId xmlns:a16="http://schemas.microsoft.com/office/drawing/2014/main" xmlns="" id="{89234C29-9121-4D81-99EB-00797964D73C}"/>
+                <a16:creationId xmlns="" xmlns:a16="http://schemas.microsoft.com/office/drawing/2014/main" id="{89234C29-9121-4D81-99EB-00797964D73C}"/>
               </a:ext>
             </a:extLst>
           </p:cNvPr>
@@ -3599,7 +3600,7 @@
           <p:cNvPr id="2" name="标题 1">
             <a:extLst>
               <a:ext uri="{FF2B5EF4-FFF2-40B4-BE49-F238E27FC236}">
-                <a16:creationId xmlns:a16="http://schemas.microsoft.com/office/drawing/2014/main" xmlns="" id="{4E74936A-DA05-4C94-8A78-B8C95D0EC9E1}"/>
+                <a16:creationId xmlns="" xmlns:a16="http://schemas.microsoft.com/office/drawing/2014/main" id="{4E74936A-DA05-4C94-8A78-B8C95D0EC9E1}"/>
               </a:ext>
             </a:extLst>
           </p:cNvPr>
@@ -3636,7 +3637,7 @@
           <p:cNvPr id="3" name="内容占位符 2">
             <a:extLst>
               <a:ext uri="{FF2B5EF4-FFF2-40B4-BE49-F238E27FC236}">
-                <a16:creationId xmlns:a16="http://schemas.microsoft.com/office/drawing/2014/main" xmlns="" id="{6CD4EB59-10D3-4B15-86E3-D24705652414}"/>
+                <a16:creationId xmlns="" xmlns:a16="http://schemas.microsoft.com/office/drawing/2014/main" id="{6CD4EB59-10D3-4B15-86E3-D24705652414}"/>
               </a:ext>
             </a:extLst>
           </p:cNvPr>
@@ -3726,7 +3727,7 @@
           <p:cNvPr id="4" name="文本占位符 3">
             <a:extLst>
               <a:ext uri="{FF2B5EF4-FFF2-40B4-BE49-F238E27FC236}">
-                <a16:creationId xmlns:a16="http://schemas.microsoft.com/office/drawing/2014/main" xmlns="" id="{4615FBCE-4F73-4F95-AE35-F4D0D57D7EF2}"/>
+                <a16:creationId xmlns="" xmlns:a16="http://schemas.microsoft.com/office/drawing/2014/main" id="{4615FBCE-4F73-4F95-AE35-F4D0D57D7EF2}"/>
               </a:ext>
             </a:extLst>
           </p:cNvPr>
@@ -3797,7 +3798,7 @@
           <p:cNvPr id="5" name="日期占位符 4">
             <a:extLst>
               <a:ext uri="{FF2B5EF4-FFF2-40B4-BE49-F238E27FC236}">
-                <a16:creationId xmlns:a16="http://schemas.microsoft.com/office/drawing/2014/main" xmlns="" id="{B50B4DDF-A557-49C0-9A98-CFD25B55288B}"/>
+                <a16:creationId xmlns="" xmlns:a16="http://schemas.microsoft.com/office/drawing/2014/main" id="{B50B4DDF-A557-49C0-9A98-CFD25B55288B}"/>
               </a:ext>
             </a:extLst>
           </p:cNvPr>
@@ -3815,7 +3816,7 @@
           <a:p>
             <a:fld id="{ECB3A450-DB7F-4EB3-91CC-C8B58F538803}" type="datetimeFigureOut">
               <a:rPr lang="zh-CN" altLang="en-US" smtClean="0"/>
-              <a:t>2019/7/1</a:t>
+              <a:t>2019/7/4</a:t>
             </a:fld>
             <a:endParaRPr lang="zh-CN" altLang="en-US"/>
           </a:p>
@@ -3826,7 +3827,7 @@
           <p:cNvPr id="6" name="页脚占位符 5">
             <a:extLst>
               <a:ext uri="{FF2B5EF4-FFF2-40B4-BE49-F238E27FC236}">
-                <a16:creationId xmlns:a16="http://schemas.microsoft.com/office/drawing/2014/main" xmlns="" id="{3DF7ADB9-B718-46F6-93EA-D231E5FECC15}"/>
+                <a16:creationId xmlns="" xmlns:a16="http://schemas.microsoft.com/office/drawing/2014/main" id="{3DF7ADB9-B718-46F6-93EA-D231E5FECC15}"/>
               </a:ext>
             </a:extLst>
           </p:cNvPr>
@@ -3851,7 +3852,7 @@
           <p:cNvPr id="7" name="灯片编号占位符 6">
             <a:extLst>
               <a:ext uri="{FF2B5EF4-FFF2-40B4-BE49-F238E27FC236}">
-                <a16:creationId xmlns:a16="http://schemas.microsoft.com/office/drawing/2014/main" xmlns="" id="{D1E921A2-E6F3-490E-8BE2-27B20B830F5C}"/>
+                <a16:creationId xmlns="" xmlns:a16="http://schemas.microsoft.com/office/drawing/2014/main" id="{D1E921A2-E6F3-490E-8BE2-27B20B830F5C}"/>
               </a:ext>
             </a:extLst>
           </p:cNvPr>
@@ -3910,7 +3911,7 @@
           <p:cNvPr id="2" name="标题 1">
             <a:extLst>
               <a:ext uri="{FF2B5EF4-FFF2-40B4-BE49-F238E27FC236}">
-                <a16:creationId xmlns:a16="http://schemas.microsoft.com/office/drawing/2014/main" xmlns="" id="{B1AC7554-CED3-47A9-9688-1535DAB0FB72}"/>
+                <a16:creationId xmlns="" xmlns:a16="http://schemas.microsoft.com/office/drawing/2014/main" id="{B1AC7554-CED3-47A9-9688-1535DAB0FB72}"/>
               </a:ext>
             </a:extLst>
           </p:cNvPr>
@@ -3947,7 +3948,7 @@
           <p:cNvPr id="3" name="图片占位符 2">
             <a:extLst>
               <a:ext uri="{FF2B5EF4-FFF2-40B4-BE49-F238E27FC236}">
-                <a16:creationId xmlns:a16="http://schemas.microsoft.com/office/drawing/2014/main" xmlns="" id="{EFD40F63-FC78-41CF-98EA-9956CA8B5B83}"/>
+                <a16:creationId xmlns="" xmlns:a16="http://schemas.microsoft.com/office/drawing/2014/main" id="{EFD40F63-FC78-41CF-98EA-9956CA8B5B83}"/>
               </a:ext>
             </a:extLst>
           </p:cNvPr>
@@ -4014,7 +4015,7 @@
           <p:cNvPr id="4" name="文本占位符 3">
             <a:extLst>
               <a:ext uri="{FF2B5EF4-FFF2-40B4-BE49-F238E27FC236}">
-                <a16:creationId xmlns:a16="http://schemas.microsoft.com/office/drawing/2014/main" xmlns="" id="{36B1E91B-373B-4F25-A861-57269B01C0D4}"/>
+                <a16:creationId xmlns="" xmlns:a16="http://schemas.microsoft.com/office/drawing/2014/main" id="{36B1E91B-373B-4F25-A861-57269B01C0D4}"/>
               </a:ext>
             </a:extLst>
           </p:cNvPr>
@@ -4085,7 +4086,7 @@
           <p:cNvPr id="5" name="日期占位符 4">
             <a:extLst>
               <a:ext uri="{FF2B5EF4-FFF2-40B4-BE49-F238E27FC236}">
-                <a16:creationId xmlns:a16="http://schemas.microsoft.com/office/drawing/2014/main" xmlns="" id="{B8ADEA32-B5CF-478B-8F57-C7085FBBD7DB}"/>
+                <a16:creationId xmlns="" xmlns:a16="http://schemas.microsoft.com/office/drawing/2014/main" id="{B8ADEA32-B5CF-478B-8F57-C7085FBBD7DB}"/>
               </a:ext>
             </a:extLst>
           </p:cNvPr>
@@ -4103,7 +4104,7 @@
           <a:p>
             <a:fld id="{ECB3A450-DB7F-4EB3-91CC-C8B58F538803}" type="datetimeFigureOut">
               <a:rPr lang="zh-CN" altLang="en-US" smtClean="0"/>
-              <a:t>2019/7/1</a:t>
+              <a:t>2019/7/4</a:t>
             </a:fld>
             <a:endParaRPr lang="zh-CN" altLang="en-US"/>
           </a:p>
@@ -4114,7 +4115,7 @@
           <p:cNvPr id="6" name="页脚占位符 5">
             <a:extLst>
               <a:ext uri="{FF2B5EF4-FFF2-40B4-BE49-F238E27FC236}">
-                <a16:creationId xmlns:a16="http://schemas.microsoft.com/office/drawing/2014/main" xmlns="" id="{C0054568-4DE7-4255-842B-F049BFF74A60}"/>
+                <a16:creationId xmlns="" xmlns:a16="http://schemas.microsoft.com/office/drawing/2014/main" id="{C0054568-4DE7-4255-842B-F049BFF74A60}"/>
               </a:ext>
             </a:extLst>
           </p:cNvPr>
@@ -4139,7 +4140,7 @@
           <p:cNvPr id="7" name="灯片编号占位符 6">
             <a:extLst>
               <a:ext uri="{FF2B5EF4-FFF2-40B4-BE49-F238E27FC236}">
-                <a16:creationId xmlns:a16="http://schemas.microsoft.com/office/drawing/2014/main" xmlns="" id="{76269F1D-4135-48B4-8848-A81FB95CCEC1}"/>
+                <a16:creationId xmlns="" xmlns:a16="http://schemas.microsoft.com/office/drawing/2014/main" id="{76269F1D-4135-48B4-8848-A81FB95CCEC1}"/>
               </a:ext>
             </a:extLst>
           </p:cNvPr>
@@ -4203,7 +4204,7 @@
           <p:cNvPr id="2" name="标题占位符 1">
             <a:extLst>
               <a:ext uri="{FF2B5EF4-FFF2-40B4-BE49-F238E27FC236}">
-                <a16:creationId xmlns:a16="http://schemas.microsoft.com/office/drawing/2014/main" xmlns="" id="{F4C90289-D81C-40DC-9A42-E3D0347B0B8E}"/>
+                <a16:creationId xmlns="" xmlns:a16="http://schemas.microsoft.com/office/drawing/2014/main" id="{F4C90289-D81C-40DC-9A42-E3D0347B0B8E}"/>
               </a:ext>
             </a:extLst>
           </p:cNvPr>
@@ -4241,7 +4242,7 @@
           <p:cNvPr id="3" name="文本占位符 2">
             <a:extLst>
               <a:ext uri="{FF2B5EF4-FFF2-40B4-BE49-F238E27FC236}">
-                <a16:creationId xmlns:a16="http://schemas.microsoft.com/office/drawing/2014/main" xmlns="" id="{C8B12E8F-FAF6-4DCF-BFFA-40213270A118}"/>
+                <a16:creationId xmlns="" xmlns:a16="http://schemas.microsoft.com/office/drawing/2014/main" id="{C8B12E8F-FAF6-4DCF-BFFA-40213270A118}"/>
               </a:ext>
             </a:extLst>
           </p:cNvPr>
@@ -4308,7 +4309,7 @@
           <p:cNvPr id="4" name="日期占位符 3">
             <a:extLst>
               <a:ext uri="{FF2B5EF4-FFF2-40B4-BE49-F238E27FC236}">
-                <a16:creationId xmlns:a16="http://schemas.microsoft.com/office/drawing/2014/main" xmlns="" id="{C5A3614F-3415-43C1-83AD-59D21175008D}"/>
+                <a16:creationId xmlns="" xmlns:a16="http://schemas.microsoft.com/office/drawing/2014/main" id="{C5A3614F-3415-43C1-83AD-59D21175008D}"/>
               </a:ext>
             </a:extLst>
           </p:cNvPr>
@@ -4344,7 +4345,7 @@
           <a:p>
             <a:fld id="{ECB3A450-DB7F-4EB3-91CC-C8B58F538803}" type="datetimeFigureOut">
               <a:rPr lang="zh-CN" altLang="en-US" smtClean="0"/>
-              <a:t>2019/7/1</a:t>
+              <a:t>2019/7/4</a:t>
             </a:fld>
             <a:endParaRPr lang="zh-CN" altLang="en-US"/>
           </a:p>
@@ -4355,7 +4356,7 @@
           <p:cNvPr id="5" name="页脚占位符 4">
             <a:extLst>
               <a:ext uri="{FF2B5EF4-FFF2-40B4-BE49-F238E27FC236}">
-                <a16:creationId xmlns:a16="http://schemas.microsoft.com/office/drawing/2014/main" xmlns="" id="{3EBC7342-8C50-417F-8D3C-92702C2DF2B5}"/>
+                <a16:creationId xmlns="" xmlns:a16="http://schemas.microsoft.com/office/drawing/2014/main" id="{3EBC7342-8C50-417F-8D3C-92702C2DF2B5}"/>
               </a:ext>
             </a:extLst>
           </p:cNvPr>
@@ -4398,7 +4399,7 @@
           <p:cNvPr id="6" name="灯片编号占位符 5">
             <a:extLst>
               <a:ext uri="{FF2B5EF4-FFF2-40B4-BE49-F238E27FC236}">
-                <a16:creationId xmlns:a16="http://schemas.microsoft.com/office/drawing/2014/main" xmlns="" id="{BCFDE490-935A-4843-8F46-C0D6B5A5AFAE}"/>
+                <a16:creationId xmlns="" xmlns:a16="http://schemas.microsoft.com/office/drawing/2014/main" id="{BCFDE490-935A-4843-8F46-C0D6B5A5AFAE}"/>
               </a:ext>
             </a:extLst>
           </p:cNvPr>
@@ -4810,7 +4811,7 @@
           <p:cNvPr id="6" name="标题 1">
             <a:extLst>
               <a:ext uri="{FF2B5EF4-FFF2-40B4-BE49-F238E27FC236}">
-                <a16:creationId xmlns:a16="http://schemas.microsoft.com/office/drawing/2014/main" xmlns="" id="{EE6E3DE5-5605-47FB-93C5-458C195E4898}"/>
+                <a16:creationId xmlns="" xmlns:a16="http://schemas.microsoft.com/office/drawing/2014/main" id="{EE6E3DE5-5605-47FB-93C5-458C195E4898}"/>
               </a:ext>
             </a:extLst>
           </p:cNvPr>
@@ -4913,6 +4914,273 @@
       </p:grpSpPr>
       <p:sp>
         <p:nvSpPr>
+          <p:cNvPr id="3" name="标题 2">
+            <a:extLst>
+              <a:ext uri="{FF2B5EF4-FFF2-40B4-BE49-F238E27FC236}">
+                <a16:creationId xmlns="" xmlns:a16="http://schemas.microsoft.com/office/drawing/2014/main" id="{EBF8B4A5-98DF-4363-B020-836C55A63844}"/>
+              </a:ext>
+            </a:extLst>
+          </p:cNvPr>
+          <p:cNvSpPr>
+            <a:spLocks noGrp="1"/>
+          </p:cNvSpPr>
+          <p:nvPr>
+            <p:ph type="title"/>
+          </p:nvPr>
+        </p:nvSpPr>
+        <p:spPr>
+          <a:xfrm>
+            <a:off x="563033" y="329971"/>
+            <a:ext cx="10515600" cy="1325563"/>
+          </a:xfrm>
+        </p:spPr>
+        <p:txBody>
+          <a:bodyPr/>
+          <a:lstStyle/>
+          <a:p>
+            <a:r>
+              <a:rPr lang="en-US" altLang="zh-CN" dirty="0" smtClean="0"/>
+              <a:t>2.4 </a:t>
+            </a:r>
+            <a:r>
+              <a:rPr lang="zh-CN" altLang="en-US" dirty="0" smtClean="0"/>
+              <a:t>云平台</a:t>
+            </a:r>
+            <a:r>
+              <a:rPr lang="en-US" altLang="zh-CN" dirty="0" smtClean="0"/>
+              <a:t> </a:t>
+            </a:r>
+            <a:endParaRPr lang="zh-CN" altLang="en-US" dirty="0"/>
+          </a:p>
+        </p:txBody>
+      </p:sp>
+      <p:sp>
+        <p:nvSpPr>
+          <p:cNvPr id="4" name="灯片编号占位符 3">
+            <a:extLst>
+              <a:ext uri="{FF2B5EF4-FFF2-40B4-BE49-F238E27FC236}">
+                <a16:creationId xmlns="" xmlns:a16="http://schemas.microsoft.com/office/drawing/2014/main" id="{8F99CB2C-FCBF-4F69-8DFB-B9FE8F1F5227}"/>
+              </a:ext>
+            </a:extLst>
+          </p:cNvPr>
+          <p:cNvSpPr>
+            <a:spLocks noGrp="1"/>
+          </p:cNvSpPr>
+          <p:nvPr>
+            <p:ph type="sldNum" sz="quarter" idx="12"/>
+          </p:nvPr>
+        </p:nvSpPr>
+        <p:spPr/>
+        <p:txBody>
+          <a:bodyPr/>
+          <a:lstStyle/>
+          <a:p>
+            <a:r>
+              <a:rPr lang="zh-CN" altLang="en-US">
+                <a:solidFill>
+                  <a:srgbClr val="898989"/>
+                </a:solidFill>
+              </a:rPr>
+              <a:t>第</a:t>
+            </a:r>
+            <a:fld id="{341B1417-7C6B-406C-85A3-E980EC4DDF6C}" type="slidenum">
+              <a:rPr lang="en-US" altLang="zh-CN" smtClean="0"/>
+              <a:pPr/>
+              <a:t>10</a:t>
+            </a:fld>
+            <a:r>
+              <a:rPr lang="zh-CN" altLang="en-US">
+                <a:solidFill>
+                  <a:srgbClr val="898989"/>
+                </a:solidFill>
+              </a:rPr>
+              <a:t>页</a:t>
+            </a:r>
+            <a:endParaRPr lang="zh-CN" altLang="en-US" dirty="0">
+              <a:solidFill>
+                <a:srgbClr val="898989"/>
+              </a:solidFill>
+            </a:endParaRPr>
+          </a:p>
+        </p:txBody>
+      </p:sp>
+      <p:sp>
+        <p:nvSpPr>
+          <p:cNvPr id="10" name="矩形 9">
+            <a:extLst>
+              <a:ext uri="{FF2B5EF4-FFF2-40B4-BE49-F238E27FC236}">
+                <a16:creationId xmlns="" xmlns:a16="http://schemas.microsoft.com/office/drawing/2014/main" id="{06C24902-2F25-4117-8643-0B09B0AC91C4}"/>
+              </a:ext>
+            </a:extLst>
+          </p:cNvPr>
+          <p:cNvSpPr/>
+          <p:nvPr/>
+        </p:nvSpPr>
+        <p:spPr>
+          <a:xfrm>
+            <a:off x="2179734" y="5987018"/>
+            <a:ext cx="8322733" cy="369332"/>
+          </a:xfrm>
+          <a:prstGeom prst="rect">
+            <a:avLst/>
+          </a:prstGeom>
+        </p:spPr>
+        <p:txBody>
+          <a:bodyPr wrap="square">
+            <a:spAutoFit/>
+          </a:bodyPr>
+          <a:lstStyle/>
+          <a:p>
+            <a:r>
+              <a:rPr lang="zh-CN" altLang="en-US" dirty="0" smtClean="0"/>
+              <a:t>注：需要适当修改该图片。</a:t>
+            </a:r>
+            <a:endParaRPr lang="en-US" altLang="zh-CN" dirty="0" smtClean="0"/>
+          </a:p>
+        </p:txBody>
+      </p:sp>
+      <p:pic>
+        <p:nvPicPr>
+          <p:cNvPr id="2052" name="Picture 4" descr="https://timgsa.baidu.com/timg?image&amp;quality=80&amp;size=b9999_10000&amp;sec=1561727415964&amp;di=21a832ade8d0bfa250bbafe733106ae9&amp;imgtype=0&amp;src=http%3A%2F%2Fimg.mp.itc.cn%2Fupload%2F20160812%2F7da7bd360b754886b20e53d10f2804ac_th.jpeg"/>
+          <p:cNvPicPr>
+            <a:picLocks noChangeAspect="1" noChangeArrowheads="1"/>
+          </p:cNvPicPr>
+          <p:nvPr/>
+        </p:nvPicPr>
+        <p:blipFill>
+          <a:blip r:embed="rId2">
+            <a:extLst>
+              <a:ext uri="{28A0092B-C50C-407E-A947-70E740481C1C}">
+                <a14:useLocalDpi xmlns:a14="http://schemas.microsoft.com/office/drawing/2010/main" val="0"/>
+              </a:ext>
+            </a:extLst>
+          </a:blip>
+          <a:srcRect/>
+          <a:stretch>
+            <a:fillRect/>
+          </a:stretch>
+        </p:blipFill>
+        <p:spPr bwMode="auto">
+          <a:xfrm>
+            <a:off x="2488556" y="2650635"/>
+            <a:ext cx="5381263" cy="3336383"/>
+          </a:xfrm>
+          <a:prstGeom prst="rect">
+            <a:avLst/>
+          </a:prstGeom>
+          <a:noFill/>
+          <a:extLst>
+            <a:ext uri="{909E8E84-426E-40DD-AFC4-6F175D3DCCD1}">
+              <a14:hiddenFill xmlns:a14="http://schemas.microsoft.com/office/drawing/2010/main">
+                <a:solidFill>
+                  <a:srgbClr val="FFFFFF"/>
+                </a:solidFill>
+              </a14:hiddenFill>
+            </a:ext>
+          </a:extLst>
+        </p:spPr>
+      </p:pic>
+      <p:sp>
+        <p:nvSpPr>
+          <p:cNvPr id="13" name="矩形 12">
+            <a:extLst>
+              <a:ext uri="{FF2B5EF4-FFF2-40B4-BE49-F238E27FC236}">
+                <a16:creationId xmlns="" xmlns:a16="http://schemas.microsoft.com/office/drawing/2014/main" id="{06C24902-2F25-4117-8643-0B09B0AC91C4}"/>
+              </a:ext>
+            </a:extLst>
+          </p:cNvPr>
+          <p:cNvSpPr/>
+          <p:nvPr/>
+        </p:nvSpPr>
+        <p:spPr>
+          <a:xfrm>
+            <a:off x="1659467" y="1616663"/>
+            <a:ext cx="8322733" cy="923330"/>
+          </a:xfrm>
+          <a:prstGeom prst="rect">
+            <a:avLst/>
+          </a:prstGeom>
+        </p:spPr>
+        <p:txBody>
+          <a:bodyPr wrap="square">
+            <a:spAutoFit/>
+          </a:bodyPr>
+          <a:lstStyle/>
+          <a:p>
+            <a:r>
+              <a:rPr lang="en-US" altLang="zh-CN" dirty="0" smtClean="0"/>
+              <a:t>1 </a:t>
+            </a:r>
+            <a:r>
+              <a:rPr lang="zh-CN" altLang="en-US" dirty="0" smtClean="0"/>
+              <a:t>客户端（</a:t>
+            </a:r>
+            <a:r>
+              <a:rPr lang="en-US" altLang="zh-CN" dirty="0" smtClean="0"/>
+              <a:t>APP,</a:t>
+            </a:r>
+            <a:r>
+              <a:rPr lang="zh-CN" altLang="en-US" dirty="0" smtClean="0"/>
+              <a:t>检测设备等）采集数据直接发送给云平台</a:t>
+            </a:r>
+            <a:endParaRPr lang="en-US" altLang="zh-CN" dirty="0" smtClean="0"/>
+          </a:p>
+          <a:p>
+            <a:r>
+              <a:rPr lang="en-US" altLang="zh-CN" dirty="0" smtClean="0"/>
+              <a:t>2 </a:t>
+            </a:r>
+            <a:r>
+              <a:rPr lang="zh-CN" altLang="en-US" dirty="0" smtClean="0"/>
+              <a:t>云平台分析该数据，得到结果。发送给客户端</a:t>
+            </a:r>
+            <a:endParaRPr lang="en-US" altLang="zh-CN" dirty="0" smtClean="0"/>
+          </a:p>
+          <a:p>
+            <a:r>
+              <a:rPr lang="en-US" altLang="zh-CN" dirty="0" smtClean="0"/>
+              <a:t>3 </a:t>
+            </a:r>
+            <a:r>
+              <a:rPr lang="zh-CN" altLang="en-US" dirty="0" smtClean="0"/>
+              <a:t>客户端展示该结果</a:t>
+            </a:r>
+            <a:endParaRPr lang="en-US" altLang="zh-CN" dirty="0" smtClean="0"/>
+          </a:p>
+        </p:txBody>
+      </p:sp>
+    </p:spTree>
+    <p:extLst>
+      <p:ext uri="{BB962C8B-B14F-4D97-AF65-F5344CB8AC3E}">
+        <p14:creationId xmlns:p14="http://schemas.microsoft.com/office/powerpoint/2010/main" val="1148724376"/>
+      </p:ext>
+    </p:extLst>
+  </p:cSld>
+  <p:clrMapOvr>
+    <a:masterClrMapping/>
+  </p:clrMapOvr>
+</p:sld>
+</file>
+
+<file path=ppt/slides/slide11.xml><?xml version="1.0" encoding="utf-8"?>
+<p:sld xmlns:a="http://schemas.openxmlformats.org/drawingml/2006/main" xmlns:r="http://schemas.openxmlformats.org/officeDocument/2006/relationships" xmlns:p="http://schemas.openxmlformats.org/presentationml/2006/main">
+  <p:cSld>
+    <p:spTree>
+      <p:nvGrpSpPr>
+        <p:cNvPr id="1" name=""/>
+        <p:cNvGrpSpPr/>
+        <p:nvPr/>
+      </p:nvGrpSpPr>
+      <p:grpSpPr>
+        <a:xfrm>
+          <a:off x="0" y="0"/>
+          <a:ext cx="0" cy="0"/>
+          <a:chOff x="0" y="0"/>
+          <a:chExt cx="0" cy="0"/>
+        </a:xfrm>
+      </p:grpSpPr>
+      <p:sp>
+        <p:nvSpPr>
           <p:cNvPr id="3" name="标题 2"/>
           <p:cNvSpPr>
             <a:spLocks noGrp="1"/>
@@ -4943,7 +5211,7 @@
           <p:cNvPr id="5" name="矩形 4">
             <a:extLst>
               <a:ext uri="{FF2B5EF4-FFF2-40B4-BE49-F238E27FC236}">
-                <a16:creationId xmlns:a16="http://schemas.microsoft.com/office/drawing/2014/main" xmlns="" id="{06C24902-2F25-4117-8643-0B09B0AC91C4}"/>
+                <a16:creationId xmlns="" xmlns:a16="http://schemas.microsoft.com/office/drawing/2014/main" id="{06C24902-2F25-4117-8643-0B09B0AC91C4}"/>
               </a:ext>
             </a:extLst>
           </p:cNvPr>
@@ -5034,7 +5302,7 @@
 </p:sld>
 </file>
 
-<file path=ppt/slides/slide11.xml><?xml version="1.0" encoding="utf-8"?>
+<file path=ppt/slides/slide12.xml><?xml version="1.0" encoding="utf-8"?>
 <p:sld xmlns:a="http://schemas.openxmlformats.org/drawingml/2006/main" xmlns:r="http://schemas.openxmlformats.org/officeDocument/2006/relationships" xmlns:p="http://schemas.openxmlformats.org/presentationml/2006/main">
   <p:cSld>
     <p:spTree>
@@ -5177,34 +5445,33 @@
             <p:ph type="title"/>
           </p:nvPr>
         </p:nvSpPr>
-        <p:spPr/>
+        <p:spPr>
+          <a:xfrm>
+            <a:off x="838200" y="365126"/>
+            <a:ext cx="10515600" cy="1139584"/>
+          </a:xfrm>
+        </p:spPr>
         <p:txBody>
-          <a:bodyPr/>
+          <a:bodyPr>
+            <a:normAutofit/>
+          </a:bodyPr>
           <a:lstStyle/>
           <a:p>
             <a:r>
-              <a:rPr lang="en-US" altLang="zh-CN" dirty="0" smtClean="0"/>
-              <a:t>1.1 </a:t>
-            </a:r>
-            <a:r>
-              <a:rPr lang="zh-CN" altLang="en-US" dirty="0" smtClean="0"/>
-              <a:t>肿瘤</a:t>
-            </a:r>
-            <a:r>
-              <a:rPr lang="zh-CN" altLang="en-US" dirty="0"/>
-              <a:t>标志</a:t>
-            </a:r>
-            <a:r>
-              <a:rPr lang="zh-CN" altLang="en-US" dirty="0" smtClean="0"/>
-              <a:t>物 病人数据</a:t>
-            </a:r>
-            <a:endParaRPr lang="zh-CN" altLang="en-US" dirty="0"/>
+              <a:rPr lang="en-US" altLang="zh-CN" sz="3200" dirty="0" smtClean="0"/>
+              <a:t>11</a:t>
+            </a:r>
+            <a:r>
+              <a:rPr lang="zh-CN" altLang="en-US" sz="3200" dirty="0" smtClean="0"/>
+              <a:t>个检测指标</a:t>
+            </a:r>
+            <a:endParaRPr lang="zh-CN" altLang="en-US" sz="3200" dirty="0"/>
           </a:p>
         </p:txBody>
       </p:sp>
       <p:pic>
         <p:nvPicPr>
-          <p:cNvPr id="4" name="图片 3"/>
+          <p:cNvPr id="8" name="图片 7"/>
           <p:cNvPicPr>
             <a:picLocks noChangeAspect="1"/>
           </p:cNvPicPr>
@@ -5218,32 +5485,8 @@
         </p:blipFill>
         <p:spPr>
           <a:xfrm>
-            <a:off x="381304" y="1690688"/>
-            <a:ext cx="9914479" cy="3368332"/>
-          </a:xfrm>
-          <a:prstGeom prst="rect">
-            <a:avLst/>
-          </a:prstGeom>
-        </p:spPr>
-      </p:pic>
-      <p:pic>
-        <p:nvPicPr>
-          <p:cNvPr id="5" name="图片 4"/>
-          <p:cNvPicPr>
-            <a:picLocks noChangeAspect="1"/>
-          </p:cNvPicPr>
-          <p:nvPr/>
-        </p:nvPicPr>
-        <p:blipFill>
-          <a:blip r:embed="rId3"/>
-          <a:stretch>
-            <a:fillRect/>
-          </a:stretch>
-        </p:blipFill>
-        <p:spPr>
-          <a:xfrm>
-            <a:off x="1247230" y="2623098"/>
-            <a:ext cx="11171421" cy="3198822"/>
+            <a:off x="1334468" y="2152892"/>
+            <a:ext cx="8072675" cy="2599571"/>
           </a:xfrm>
           <a:prstGeom prst="rect">
             <a:avLst/>
@@ -5253,7 +5496,7 @@
     </p:spTree>
     <p:extLst>
       <p:ext uri="{BB962C8B-B14F-4D97-AF65-F5344CB8AC3E}">
-        <p14:creationId xmlns:p14="http://schemas.microsoft.com/office/powerpoint/2010/main" val="2771392159"/>
+        <p14:creationId xmlns:p14="http://schemas.microsoft.com/office/powerpoint/2010/main" val="1040759240"/>
       </p:ext>
     </p:extLst>
   </p:cSld>
@@ -5290,35 +5533,58 @@
             <p:ph type="title"/>
           </p:nvPr>
         </p:nvSpPr>
-        <p:spPr>
-          <a:xfrm>
-            <a:off x="762000" y="178858"/>
-            <a:ext cx="10515600" cy="1325563"/>
-          </a:xfrm>
-        </p:spPr>
+        <p:spPr/>
         <p:txBody>
           <a:bodyPr/>
           <a:lstStyle/>
           <a:p>
             <a:r>
+              <a:rPr lang="zh-CN" altLang="en-US" sz="2800" dirty="0" smtClean="0"/>
+              <a:t>一些分布图（检测指标与是否住院之间的关系）</a:t>
+            </a:r>
+            <a:endParaRPr lang="zh-CN" altLang="en-US" dirty="0"/>
+          </a:p>
+        </p:txBody>
+      </p:sp>
+      <p:sp>
+        <p:nvSpPr>
+          <p:cNvPr id="5" name="矩形 4"/>
+          <p:cNvSpPr/>
+          <p:nvPr/>
+        </p:nvSpPr>
+        <p:spPr>
+          <a:xfrm>
+            <a:off x="480538" y="5050910"/>
+            <a:ext cx="6096000" cy="369332"/>
+          </a:xfrm>
+          <a:prstGeom prst="rect">
+            <a:avLst/>
+          </a:prstGeom>
+        </p:spPr>
+        <p:txBody>
+          <a:bodyPr>
+            <a:spAutoFit/>
+          </a:bodyPr>
+          <a:lstStyle/>
+          <a:p>
+            <a:r>
               <a:rPr lang="en-US" altLang="zh-CN" dirty="0" smtClean="0"/>
-              <a:t>1.2 </a:t>
+              <a:t>14008</a:t>
             </a:r>
             <a:r>
               <a:rPr lang="zh-CN" altLang="en-US" dirty="0" smtClean="0"/>
-              <a:t>数据分布</a:t>
-            </a:r>
-            <a:r>
-              <a:rPr lang="zh-CN" altLang="en-US" dirty="0" smtClean="0"/>
-              <a:t>图</a:t>
-            </a:r>
-            <a:endParaRPr lang="zh-CN" altLang="en-US" dirty="0"/>
+              <a:t>个样本，未住院    9241 住院     </a:t>
+            </a:r>
+            <a:r>
+              <a:rPr lang="zh-CN" altLang="en-US" dirty="0"/>
+              <a:t>4767</a:t>
+            </a:r>
           </a:p>
         </p:txBody>
       </p:sp>
       <p:pic>
         <p:nvPicPr>
-          <p:cNvPr id="2" name="图片 1"/>
+          <p:cNvPr id="6" name="图片 5"/>
           <p:cNvPicPr>
             <a:picLocks noChangeAspect="1"/>
           </p:cNvPicPr>
@@ -5338,8 +5604,8 @@
         </p:blipFill>
         <p:spPr>
           <a:xfrm>
-            <a:off x="5253297" y="1307426"/>
-            <a:ext cx="3097303" cy="2755608"/>
+            <a:off x="859370" y="1538047"/>
+            <a:ext cx="3938088" cy="3360143"/>
           </a:xfrm>
           <a:prstGeom prst="rect">
             <a:avLst/>
@@ -5348,7 +5614,7 @@
       </p:pic>
       <p:pic>
         <p:nvPicPr>
-          <p:cNvPr id="4" name="图片 3"/>
+          <p:cNvPr id="8" name="图片 7"/>
           <p:cNvPicPr>
             <a:picLocks noChangeAspect="1"/>
           </p:cNvPicPr>
@@ -5368,8 +5634,8 @@
         </p:blipFill>
         <p:spPr>
           <a:xfrm>
-            <a:off x="1174889" y="1253067"/>
-            <a:ext cx="3208528" cy="2854562"/>
+            <a:off x="5430984" y="2813045"/>
+            <a:ext cx="3055635" cy="2607197"/>
           </a:xfrm>
           <a:prstGeom prst="rect">
             <a:avLst/>
@@ -5378,7 +5644,7 @@
       </p:pic>
       <p:pic>
         <p:nvPicPr>
-          <p:cNvPr id="5" name="图片 4"/>
+          <p:cNvPr id="9" name="图片 8"/>
           <p:cNvPicPr>
             <a:picLocks noChangeAspect="1"/>
           </p:cNvPicPr>
@@ -5398,8 +5664,8 @@
         </p:blipFill>
         <p:spPr>
           <a:xfrm>
-            <a:off x="1174889" y="4107629"/>
-            <a:ext cx="2921576" cy="2599267"/>
+            <a:off x="8617622" y="3850955"/>
+            <a:ext cx="3055635" cy="2607197"/>
           </a:xfrm>
           <a:prstGeom prst="rect">
             <a:avLst/>
@@ -5408,7 +5674,7 @@
       </p:pic>
       <p:pic>
         <p:nvPicPr>
-          <p:cNvPr id="6" name="图片 5"/>
+          <p:cNvPr id="7" name="图片 6"/>
           <p:cNvPicPr>
             <a:picLocks noChangeAspect="1"/>
           </p:cNvPicPr>
@@ -5428,8 +5694,8 @@
         </p:blipFill>
         <p:spPr>
           <a:xfrm>
-            <a:off x="5188347" y="3971674"/>
-            <a:ext cx="3227202" cy="2871176"/>
+            <a:off x="7946628" y="1210678"/>
+            <a:ext cx="2528654" cy="2157555"/>
           </a:xfrm>
           <a:prstGeom prst="rect">
             <a:avLst/>
@@ -5439,20 +5705,13 @@
     </p:spTree>
     <p:extLst>
       <p:ext uri="{BB962C8B-B14F-4D97-AF65-F5344CB8AC3E}">
-        <p14:creationId xmlns:p14="http://schemas.microsoft.com/office/powerpoint/2010/main" val="1139749772"/>
+        <p14:creationId xmlns:p14="http://schemas.microsoft.com/office/powerpoint/2010/main" val="738908966"/>
       </p:ext>
     </p:extLst>
   </p:cSld>
   <p:clrMapOvr>
     <a:masterClrMapping/>
   </p:clrMapOvr>
-  <p:timing>
-    <p:tnLst>
-      <p:par>
-        <p:cTn id="1" dur="indefinite" restart="never" nodeType="tmRoot"/>
-      </p:par>
-    </p:tnLst>
-  </p:timing>
 </p:sld>
 </file>
 
@@ -5490,27 +5749,42 @@
           <a:p>
             <a:r>
               <a:rPr lang="en-US" altLang="zh-CN" dirty="0" smtClean="0"/>
-              <a:t>1.3 </a:t>
-            </a:r>
-            <a:r>
-              <a:rPr lang="zh-CN" altLang="en-US" sz="3200" dirty="0" smtClean="0"/>
-              <a:t>一些</a:t>
-            </a:r>
-            <a:r>
-              <a:rPr lang="zh-CN" altLang="en-US" sz="3200" dirty="0" smtClean="0"/>
-              <a:t>检测指标与年龄，性别之间的</a:t>
-            </a:r>
-            <a:r>
-              <a:rPr lang="zh-CN" altLang="en-US" sz="3200" dirty="0" smtClean="0"/>
-              <a:t>关系</a:t>
-            </a:r>
-            <a:endParaRPr lang="zh-CN" altLang="en-US" sz="3200" dirty="0"/>
+              <a:t>11</a:t>
+            </a:r>
+            <a:r>
+              <a:rPr lang="zh-CN" altLang="en-US" dirty="0" smtClean="0"/>
+              <a:t>个</a:t>
+            </a:r>
+            <a:r>
+              <a:rPr lang="zh-CN" altLang="en-US" dirty="0"/>
+              <a:t>检测指标</a:t>
+            </a:r>
+            <a:r>
+              <a:rPr lang="en-US" altLang="zh-CN" dirty="0"/>
+              <a:t>	</a:t>
+            </a:r>
+            <a:r>
+              <a:rPr lang="zh-CN" altLang="en-US" dirty="0"/>
+              <a:t>（准确率 </a:t>
+            </a:r>
+            <a:r>
+              <a:rPr lang="en-US" altLang="zh-CN" dirty="0" smtClean="0"/>
+              <a:t>90.7</a:t>
+            </a:r>
+            <a:r>
+              <a:rPr lang="en-US" altLang="zh-CN" dirty="0"/>
+              <a:t>%</a:t>
+            </a:r>
+            <a:r>
+              <a:rPr lang="zh-CN" altLang="en-US" dirty="0"/>
+              <a:t>）</a:t>
+            </a:r>
           </a:p>
         </p:txBody>
       </p:sp>
       <p:pic>
         <p:nvPicPr>
-          <p:cNvPr id="7" name="图片 6"/>
+          <p:cNvPr id="6" name="图片 5"/>
           <p:cNvPicPr>
             <a:picLocks noChangeAspect="1"/>
           </p:cNvPicPr>
@@ -5524,8 +5798,8 @@
         </p:blipFill>
         <p:spPr>
           <a:xfrm>
-            <a:off x="936446" y="2002179"/>
-            <a:ext cx="9015241" cy="4343776"/>
+            <a:off x="729204" y="1690688"/>
+            <a:ext cx="5023413" cy="3767560"/>
           </a:xfrm>
           <a:prstGeom prst="rect">
             <a:avLst/>
@@ -5534,51 +5808,131 @@
       </p:pic>
       <p:pic>
         <p:nvPicPr>
-          <p:cNvPr id="8" name="图片 7"/>
+          <p:cNvPr id="5" name="图片 4"/>
           <p:cNvPicPr>
             <a:picLocks noChangeAspect="1"/>
           </p:cNvPicPr>
           <p:nvPr/>
         </p:nvPicPr>
         <p:blipFill>
-          <a:blip r:embed="rId3">
-            <a:extLst>
-              <a:ext uri="{28A0092B-C50C-407E-A947-70E740481C1C}">
-                <a14:useLocalDpi xmlns:a14="http://schemas.microsoft.com/office/drawing/2010/main" val="0"/>
-              </a:ext>
-            </a:extLst>
-          </a:blip>
+          <a:blip r:embed="rId3"/>
           <a:stretch>
             <a:fillRect/>
           </a:stretch>
         </p:blipFill>
         <p:spPr>
           <a:xfrm>
-            <a:off x="2980266" y="1371600"/>
-            <a:ext cx="4572000" cy="4572000"/>
+            <a:off x="5752617" y="1867926"/>
+            <a:ext cx="5983870" cy="3590322"/>
           </a:xfrm>
           <a:prstGeom prst="rect">
             <a:avLst/>
           </a:prstGeom>
         </p:spPr>
       </p:pic>
+      <p:sp>
+        <p:nvSpPr>
+          <p:cNvPr id="7" name="矩形 6">
+            <a:extLst>
+              <a:ext uri="{FF2B5EF4-FFF2-40B4-BE49-F238E27FC236}">
+                <a16:creationId xmlns="" xmlns:a16="http://schemas.microsoft.com/office/drawing/2014/main" id="{CEDECA9F-8B31-4840-B0EF-FB7FC1C5AA9A}"/>
+              </a:ext>
+            </a:extLst>
+          </p:cNvPr>
+          <p:cNvSpPr/>
+          <p:nvPr/>
+        </p:nvSpPr>
+        <p:spPr>
+          <a:xfrm>
+            <a:off x="1428509" y="5635486"/>
+            <a:ext cx="9821333" cy="1015663"/>
+          </a:xfrm>
+          <a:prstGeom prst="rect">
+            <a:avLst/>
+          </a:prstGeom>
+        </p:spPr>
+        <p:txBody>
+          <a:bodyPr wrap="square">
+            <a:spAutoFit/>
+          </a:bodyPr>
+          <a:lstStyle/>
+          <a:p>
+            <a:r>
+              <a:rPr lang="en-US" altLang="zh-CN" sz="2000" dirty="0" smtClean="0"/>
+              <a:t>14008</a:t>
+            </a:r>
+            <a:r>
+              <a:rPr lang="zh-CN" altLang="en-US" sz="2000" dirty="0" smtClean="0"/>
+              <a:t>个样本，</a:t>
+            </a:r>
+            <a:r>
+              <a:rPr lang="en-US" altLang="zh-CN" sz="2000" dirty="0" smtClean="0"/>
+              <a:t>X</a:t>
+            </a:r>
+            <a:r>
+              <a:rPr lang="zh-CN" altLang="en-US" sz="2000" dirty="0" smtClean="0"/>
+              <a:t>的</a:t>
+            </a:r>
+            <a:r>
+              <a:rPr lang="zh-CN" altLang="en-US" sz="2000" dirty="0"/>
+              <a:t>特征包括全部</a:t>
+            </a:r>
+            <a:r>
+              <a:rPr lang="en-US" altLang="zh-CN" sz="2000" dirty="0"/>
+              <a:t>11</a:t>
+            </a:r>
+            <a:r>
+              <a:rPr lang="zh-CN" altLang="en-US" sz="2000" dirty="0"/>
+              <a:t>个检测</a:t>
+            </a:r>
+            <a:r>
+              <a:rPr lang="zh-CN" altLang="en-US" sz="2000" dirty="0" smtClean="0"/>
+              <a:t>指标以及年龄，性别</a:t>
+            </a:r>
+            <a:endParaRPr lang="en-US" altLang="zh-CN" sz="2000" dirty="0" smtClean="0"/>
+          </a:p>
+          <a:p>
+            <a:r>
+              <a:rPr lang="en-US" altLang="zh-CN" sz="2000" dirty="0" smtClean="0"/>
+              <a:t>Y</a:t>
+            </a:r>
+            <a:r>
+              <a:rPr lang="zh-CN" altLang="en-US" sz="2000" dirty="0" smtClean="0"/>
+              <a:t>是该个体是否住院（典型的二分类问题）</a:t>
+            </a:r>
+            <a:endParaRPr lang="en-US" altLang="zh-CN" sz="2000" dirty="0" smtClean="0"/>
+          </a:p>
+          <a:p>
+            <a:r>
+              <a:rPr lang="en-US" altLang="zh-CN" sz="2000" dirty="0" smtClean="0"/>
+              <a:t>5-Fold cross-validation </a:t>
+            </a:r>
+            <a:r>
+              <a:rPr lang="en-US" altLang="zh-CN" sz="2000" dirty="0" err="1" smtClean="0"/>
+              <a:t>auc</a:t>
+            </a:r>
+            <a:r>
+              <a:rPr lang="en-US" altLang="zh-CN" sz="2000" dirty="0" smtClean="0"/>
+              <a:t>=0.907</a:t>
+            </a:r>
+            <a:r>
+              <a:rPr lang="zh-CN" altLang="en-US" sz="1200" dirty="0" smtClean="0"/>
+              <a:t>，</a:t>
+            </a:r>
+            <a:endParaRPr lang="zh-CN" altLang="en-US" sz="1200" dirty="0"/>
+          </a:p>
+        </p:txBody>
+      </p:sp>
     </p:spTree>
     <p:extLst>
       <p:ext uri="{BB962C8B-B14F-4D97-AF65-F5344CB8AC3E}">
-        <p14:creationId xmlns:p14="http://schemas.microsoft.com/office/powerpoint/2010/main" val="4008579719"/>
+        <p14:creationId xmlns:p14="http://schemas.microsoft.com/office/powerpoint/2010/main" val="4107660368"/>
       </p:ext>
     </p:extLst>
   </p:cSld>
   <p:clrMapOvr>
     <a:masterClrMapping/>
   </p:clrMapOvr>
-  <p:timing>
-    <p:tnLst>
-      <p:par>
-        <p:cTn id="1" dur="indefinite" restart="never" nodeType="tmRoot"/>
-      </p:par>
-    </p:tnLst>
-  </p:timing>
 </p:sld>
 </file>
 
@@ -5611,154 +5965,40 @@
         </p:nvSpPr>
         <p:spPr/>
         <p:txBody>
-          <a:bodyPr>
-            <a:normAutofit/>
-          </a:bodyPr>
+          <a:bodyPr/>
           <a:lstStyle/>
           <a:p>
             <a:r>
-              <a:rPr lang="en-US" altLang="zh-CN" sz="3600" dirty="0" smtClean="0"/>
-              <a:t>1.4 </a:t>
-            </a:r>
-            <a:r>
-              <a:rPr lang="zh-CN" altLang="en-US" sz="3600" dirty="0" smtClean="0"/>
-              <a:t>一些初步学习的</a:t>
-            </a:r>
-            <a:r>
-              <a:rPr lang="zh-CN" altLang="en-US" sz="3600" dirty="0" smtClean="0"/>
-              <a:t>结果</a:t>
-            </a:r>
-            <a:endParaRPr lang="zh-CN" altLang="en-US" sz="3600" dirty="0"/>
-          </a:p>
-        </p:txBody>
-      </p:sp>
-      <p:sp>
-        <p:nvSpPr>
-          <p:cNvPr id="6" name="矩形 5">
-            <a:extLst>
-              <a:ext uri="{FF2B5EF4-FFF2-40B4-BE49-F238E27FC236}">
-                <a16:creationId xmlns:a16="http://schemas.microsoft.com/office/drawing/2014/main" xmlns="" id="{06C24902-2F25-4117-8643-0B09B0AC91C4}"/>
-              </a:ext>
-            </a:extLst>
-          </p:cNvPr>
-          <p:cNvSpPr/>
-          <p:nvPr/>
-        </p:nvSpPr>
-        <p:spPr>
-          <a:xfrm>
-            <a:off x="1096433" y="4946716"/>
-            <a:ext cx="8322733" cy="2031325"/>
-          </a:xfrm>
-          <a:prstGeom prst="rect">
-            <a:avLst/>
-          </a:prstGeom>
-        </p:spPr>
-        <p:txBody>
-          <a:bodyPr wrap="square">
-            <a:spAutoFit/>
-          </a:bodyPr>
-          <a:lstStyle/>
-          <a:p>
-            <a:r>
               <a:rPr lang="en-US" altLang="zh-CN" dirty="0" smtClean="0"/>
-              <a:t>1 </a:t>
+              <a:t>5</a:t>
             </a:r>
             <a:r>
               <a:rPr lang="zh-CN" altLang="en-US" dirty="0" smtClean="0"/>
-              <a:t>每个指标，取</a:t>
+              <a:t>个检测指标</a:t>
             </a:r>
             <a:r>
               <a:rPr lang="en-US" altLang="zh-CN" dirty="0" smtClean="0"/>
-              <a:t>80%</a:t>
+              <a:t>	</a:t>
             </a:r>
             <a:r>
               <a:rPr lang="zh-CN" altLang="en-US" dirty="0" smtClean="0"/>
-              <a:t>的样本作为训练集，</a:t>
+              <a:t>（准确率 </a:t>
             </a:r>
             <a:r>
               <a:rPr lang="en-US" altLang="zh-CN" dirty="0" smtClean="0"/>
-              <a:t>20%</a:t>
+              <a:t>86.7%</a:t>
             </a:r>
             <a:r>
               <a:rPr lang="zh-CN" altLang="en-US" dirty="0" smtClean="0"/>
-              <a:t>的样本作为测试集。</a:t>
-            </a:r>
-            <a:endParaRPr lang="en-US" altLang="zh-CN" dirty="0" smtClean="0"/>
-          </a:p>
-          <a:p>
-            <a:r>
-              <a:rPr lang="zh-CN" altLang="en-US" dirty="0" smtClean="0"/>
-              <a:t>训练集用</a:t>
-            </a:r>
-            <a:r>
-              <a:rPr lang="en-US" altLang="zh-CN" dirty="0" err="1" smtClean="0"/>
-              <a:t>GBDT</a:t>
-            </a:r>
-            <a:r>
-              <a:rPr lang="zh-CN" altLang="en-US" dirty="0" smtClean="0"/>
-              <a:t>类算法得到模型，然后在测试集上预测。</a:t>
-            </a:r>
-            <a:endParaRPr lang="en-US" altLang="zh-CN" dirty="0" smtClean="0"/>
-          </a:p>
-          <a:p>
-            <a:r>
-              <a:rPr lang="zh-CN" altLang="en-US" dirty="0" smtClean="0"/>
-              <a:t>预测值和医院的检测值进行比对，得到预测偏差</a:t>
-            </a:r>
-            <a:endParaRPr lang="en-US" altLang="zh-CN" dirty="0" smtClean="0"/>
-          </a:p>
-          <a:p>
-            <a:endParaRPr lang="en-US" altLang="zh-CN" dirty="0" smtClean="0"/>
-          </a:p>
-          <a:p>
-            <a:r>
-              <a:rPr lang="en-US" altLang="zh-CN" dirty="0" smtClean="0"/>
-              <a:t>2 </a:t>
-            </a:r>
-            <a:r>
-              <a:rPr lang="en-US" altLang="zh-CN" dirty="0" err="1" smtClean="0"/>
-              <a:t>PGII,PGI,F</a:t>
-            </a:r>
-            <a:r>
-              <a:rPr lang="en-US" altLang="zh-CN" dirty="0" smtClean="0"/>
-              <a:t>-PSA/PSA</a:t>
-            </a:r>
-            <a:r>
-              <a:rPr lang="zh-CN" altLang="en-US" dirty="0" smtClean="0"/>
-              <a:t>的回归结果较好，似乎可以用来预测</a:t>
-            </a:r>
-            <a:endParaRPr lang="en-US" altLang="zh-CN" dirty="0" smtClean="0"/>
-          </a:p>
-          <a:p>
-            <a:r>
-              <a:rPr lang="en-US" altLang="zh-CN" dirty="0" smtClean="0"/>
-              <a:t>3 </a:t>
-            </a:r>
-            <a:r>
-              <a:rPr lang="zh-CN" altLang="en-US" dirty="0" smtClean="0"/>
-              <a:t>预测年龄的效果很差</a:t>
-            </a:r>
-            <a:r>
-              <a:rPr lang="en-US" altLang="zh-CN" dirty="0" smtClean="0"/>
-              <a:t>   </a:t>
-            </a:r>
-          </a:p>
-          <a:p>
-            <a:r>
-              <a:rPr lang="en-US" altLang="zh-CN" dirty="0"/>
-              <a:t> </a:t>
-            </a:r>
-            <a:r>
-              <a:rPr lang="en-US" altLang="zh-CN" dirty="0" smtClean="0"/>
-              <a:t>   </a:t>
-            </a:r>
-            <a:endParaRPr lang="en-US" altLang="zh-CN" dirty="0"/>
+              <a:t>）</a:t>
+            </a:r>
+            <a:endParaRPr lang="zh-CN" altLang="en-US" dirty="0"/>
           </a:p>
         </p:txBody>
       </p:sp>
       <p:pic>
         <p:nvPicPr>
-          <p:cNvPr id="7" name="图片 6"/>
+          <p:cNvPr id="4" name="图片 3"/>
           <p:cNvPicPr>
             <a:picLocks noChangeAspect="1"/>
           </p:cNvPicPr>
@@ -5772,18 +6012,143 @@
         </p:blipFill>
         <p:spPr>
           <a:xfrm>
-            <a:off x="1524529" y="1382459"/>
-            <a:ext cx="7331075" cy="3398815"/>
+            <a:off x="5612998" y="2286181"/>
+            <a:ext cx="4762500" cy="2857500"/>
           </a:xfrm>
           <a:prstGeom prst="rect">
             <a:avLst/>
           </a:prstGeom>
         </p:spPr>
       </p:pic>
+      <p:pic>
+        <p:nvPicPr>
+          <p:cNvPr id="5" name="图片 4"/>
+          <p:cNvPicPr>
+            <a:picLocks noChangeAspect="1"/>
+          </p:cNvPicPr>
+          <p:nvPr/>
+        </p:nvPicPr>
+        <p:blipFill>
+          <a:blip r:embed="rId3"/>
+          <a:stretch>
+            <a:fillRect/>
+          </a:stretch>
+        </p:blipFill>
+        <p:spPr>
+          <a:xfrm>
+            <a:off x="838200" y="1987952"/>
+            <a:ext cx="4207638" cy="3155729"/>
+          </a:xfrm>
+          <a:prstGeom prst="rect">
+            <a:avLst/>
+          </a:prstGeom>
+        </p:spPr>
+      </p:pic>
+      <p:sp>
+        <p:nvSpPr>
+          <p:cNvPr id="6" name="矩形 5">
+            <a:extLst>
+              <a:ext uri="{FF2B5EF4-FFF2-40B4-BE49-F238E27FC236}">
+                <a16:creationId xmlns="" xmlns:a16="http://schemas.microsoft.com/office/drawing/2014/main" id="{CEDECA9F-8B31-4840-B0EF-FB7FC1C5AA9A}"/>
+              </a:ext>
+            </a:extLst>
+          </p:cNvPr>
+          <p:cNvSpPr/>
+          <p:nvPr/>
+        </p:nvSpPr>
+        <p:spPr>
+          <a:xfrm>
+            <a:off x="1532467" y="5334544"/>
+            <a:ext cx="9821333" cy="1015663"/>
+          </a:xfrm>
+          <a:prstGeom prst="rect">
+            <a:avLst/>
+          </a:prstGeom>
+        </p:spPr>
+        <p:txBody>
+          <a:bodyPr wrap="square">
+            <a:spAutoFit/>
+          </a:bodyPr>
+          <a:lstStyle/>
+          <a:p>
+            <a:r>
+              <a:rPr lang="en-US" altLang="zh-CN" sz="2000" dirty="0" smtClean="0"/>
+              <a:t>14008</a:t>
+            </a:r>
+            <a:r>
+              <a:rPr lang="zh-CN" altLang="en-US" sz="2000" dirty="0" smtClean="0"/>
+              <a:t>个样本，</a:t>
+            </a:r>
+            <a:r>
+              <a:rPr lang="en-US" altLang="zh-CN" sz="2000" dirty="0" smtClean="0"/>
+              <a:t>X</a:t>
+            </a:r>
+            <a:r>
+              <a:rPr lang="zh-CN" altLang="en-US" sz="2000" dirty="0" smtClean="0"/>
+              <a:t>的</a:t>
+            </a:r>
+            <a:r>
+              <a:rPr lang="zh-CN" altLang="en-US" sz="2000" dirty="0"/>
+              <a:t>特征</a:t>
+            </a:r>
+            <a:r>
+              <a:rPr lang="zh-CN" altLang="en-US" sz="2000" dirty="0" smtClean="0"/>
+              <a:t>包括</a:t>
+            </a:r>
+            <a:r>
+              <a:rPr lang="en-US" altLang="zh-CN" sz="2000" dirty="0" smtClean="0"/>
+              <a:t>5</a:t>
+            </a:r>
+            <a:r>
+              <a:rPr lang="zh-CN" altLang="en-US" sz="2000" dirty="0" smtClean="0"/>
+              <a:t>个</a:t>
+            </a:r>
+            <a:r>
+              <a:rPr lang="zh-CN" altLang="en-US" sz="2000" dirty="0"/>
+              <a:t>检测</a:t>
+            </a:r>
+            <a:r>
+              <a:rPr lang="zh-CN" altLang="en-US" sz="2000" dirty="0" smtClean="0"/>
+              <a:t>指标以及年龄，性别</a:t>
+            </a:r>
+            <a:endParaRPr lang="en-US" altLang="zh-CN" sz="2000" dirty="0" smtClean="0"/>
+          </a:p>
+          <a:p>
+            <a:r>
+              <a:rPr lang="en-US" altLang="zh-CN" sz="2000" dirty="0" smtClean="0"/>
+              <a:t>Y</a:t>
+            </a:r>
+            <a:r>
+              <a:rPr lang="zh-CN" altLang="en-US" sz="2000" dirty="0" smtClean="0"/>
+              <a:t>是该个体是否住院（典型的二分类问题）</a:t>
+            </a:r>
+            <a:endParaRPr lang="en-US" altLang="zh-CN" sz="2000" dirty="0" smtClean="0"/>
+          </a:p>
+          <a:p>
+            <a:r>
+              <a:rPr lang="en-US" altLang="zh-CN" sz="2000" dirty="0" smtClean="0"/>
+              <a:t>5-Fold cross-validation </a:t>
+            </a:r>
+            <a:r>
+              <a:rPr lang="en-US" altLang="zh-CN" sz="2000" dirty="0" err="1" smtClean="0"/>
+              <a:t>auc</a:t>
+            </a:r>
+            <a:r>
+              <a:rPr lang="en-US" altLang="zh-CN" sz="2000" dirty="0" smtClean="0"/>
+              <a:t>=0.867</a:t>
+            </a:r>
+            <a:r>
+              <a:rPr lang="zh-CN" altLang="en-US" sz="1200" dirty="0" smtClean="0"/>
+              <a:t>，</a:t>
+            </a:r>
+            <a:endParaRPr lang="zh-CN" altLang="en-US" sz="1200" dirty="0"/>
+          </a:p>
+        </p:txBody>
+      </p:sp>
     </p:spTree>
     <p:extLst>
       <p:ext uri="{BB962C8B-B14F-4D97-AF65-F5344CB8AC3E}">
-        <p14:creationId xmlns:p14="http://schemas.microsoft.com/office/powerpoint/2010/main" val="1998225917"/>
+        <p14:creationId xmlns:p14="http://schemas.microsoft.com/office/powerpoint/2010/main" val="4265912114"/>
       </p:ext>
     </p:extLst>
   </p:cSld>
@@ -5812,10 +6177,232 @@
       </p:grpSpPr>
       <p:sp>
         <p:nvSpPr>
+          <p:cNvPr id="3" name="标题 2"/>
+          <p:cNvSpPr>
+            <a:spLocks noGrp="1"/>
+          </p:cNvSpPr>
+          <p:nvPr>
+            <p:ph type="title"/>
+          </p:nvPr>
+        </p:nvSpPr>
+        <p:spPr/>
+        <p:txBody>
+          <a:bodyPr/>
+          <a:lstStyle/>
+          <a:p>
+            <a:r>
+              <a:rPr lang="en-US" altLang="zh-CN" dirty="0" smtClean="0"/>
+              <a:t>3</a:t>
+            </a:r>
+            <a:r>
+              <a:rPr lang="zh-CN" altLang="en-US" dirty="0" smtClean="0"/>
+              <a:t>个检测指标</a:t>
+            </a:r>
+            <a:r>
+              <a:rPr lang="en-US" altLang="zh-CN" dirty="0" smtClean="0"/>
+              <a:t>	</a:t>
+            </a:r>
+            <a:r>
+              <a:rPr lang="zh-CN" altLang="en-US" dirty="0" smtClean="0"/>
+              <a:t>（准确率 </a:t>
+            </a:r>
+            <a:r>
+              <a:rPr lang="en-US" altLang="zh-CN" dirty="0" smtClean="0"/>
+              <a:t>81.9%</a:t>
+            </a:r>
+            <a:r>
+              <a:rPr lang="zh-CN" altLang="en-US" dirty="0" smtClean="0"/>
+              <a:t>）</a:t>
+            </a:r>
+            <a:endParaRPr lang="zh-CN" altLang="en-US" dirty="0"/>
+          </a:p>
+        </p:txBody>
+      </p:sp>
+      <p:pic>
+        <p:nvPicPr>
+          <p:cNvPr id="2" name="图片 1"/>
+          <p:cNvPicPr>
+            <a:picLocks noChangeAspect="1"/>
+          </p:cNvPicPr>
+          <p:nvPr/>
+        </p:nvPicPr>
+        <p:blipFill>
+          <a:blip r:embed="rId2"/>
+          <a:stretch>
+            <a:fillRect/>
+          </a:stretch>
+        </p:blipFill>
+        <p:spPr>
+          <a:xfrm>
+            <a:off x="5612996" y="1987952"/>
+            <a:ext cx="5271303" cy="3162782"/>
+          </a:xfrm>
+          <a:prstGeom prst="rect">
+            <a:avLst/>
+          </a:prstGeom>
+        </p:spPr>
+      </p:pic>
+      <p:pic>
+        <p:nvPicPr>
+          <p:cNvPr id="6" name="图片 5"/>
+          <p:cNvPicPr>
+            <a:picLocks noChangeAspect="1"/>
+          </p:cNvPicPr>
+          <p:nvPr/>
+        </p:nvPicPr>
+        <p:blipFill>
+          <a:blip r:embed="rId3"/>
+          <a:stretch>
+            <a:fillRect/>
+          </a:stretch>
+        </p:blipFill>
+        <p:spPr>
+          <a:xfrm>
+            <a:off x="1138176" y="1987952"/>
+            <a:ext cx="4217043" cy="3162782"/>
+          </a:xfrm>
+          <a:prstGeom prst="rect">
+            <a:avLst/>
+          </a:prstGeom>
+        </p:spPr>
+      </p:pic>
+      <p:sp>
+        <p:nvSpPr>
+          <p:cNvPr id="7" name="矩形 6">
+            <a:extLst>
+              <a:ext uri="{FF2B5EF4-FFF2-40B4-BE49-F238E27FC236}">
+                <a16:creationId xmlns="" xmlns:a16="http://schemas.microsoft.com/office/drawing/2014/main" id="{CEDECA9F-8B31-4840-B0EF-FB7FC1C5AA9A}"/>
+              </a:ext>
+            </a:extLst>
+          </p:cNvPr>
+          <p:cNvSpPr/>
+          <p:nvPr/>
+        </p:nvSpPr>
+        <p:spPr>
+          <a:xfrm>
+            <a:off x="1648213" y="5150734"/>
+            <a:ext cx="9821333" cy="1015663"/>
+          </a:xfrm>
+          <a:prstGeom prst="rect">
+            <a:avLst/>
+          </a:prstGeom>
+        </p:spPr>
+        <p:txBody>
+          <a:bodyPr wrap="square">
+            <a:spAutoFit/>
+          </a:bodyPr>
+          <a:lstStyle/>
+          <a:p>
+            <a:r>
+              <a:rPr lang="en-US" altLang="zh-CN" sz="2000" dirty="0" smtClean="0"/>
+              <a:t>14008</a:t>
+            </a:r>
+            <a:r>
+              <a:rPr lang="zh-CN" altLang="en-US" sz="2000" dirty="0" smtClean="0"/>
+              <a:t>个样本，</a:t>
+            </a:r>
+            <a:r>
+              <a:rPr lang="en-US" altLang="zh-CN" sz="2000" dirty="0" smtClean="0"/>
+              <a:t>X</a:t>
+            </a:r>
+            <a:r>
+              <a:rPr lang="zh-CN" altLang="en-US" sz="2000" dirty="0" smtClean="0"/>
+              <a:t>的</a:t>
+            </a:r>
+            <a:r>
+              <a:rPr lang="zh-CN" altLang="en-US" sz="2000" dirty="0"/>
+              <a:t>特征</a:t>
+            </a:r>
+            <a:r>
+              <a:rPr lang="zh-CN" altLang="en-US" sz="2000" dirty="0" smtClean="0"/>
+              <a:t>包括</a:t>
+            </a:r>
+            <a:r>
+              <a:rPr lang="en-US" altLang="zh-CN" sz="2000" dirty="0" smtClean="0"/>
+              <a:t>3</a:t>
+            </a:r>
+            <a:r>
+              <a:rPr lang="zh-CN" altLang="en-US" sz="2000" dirty="0" smtClean="0"/>
+              <a:t>个</a:t>
+            </a:r>
+            <a:r>
+              <a:rPr lang="zh-CN" altLang="en-US" sz="2000" dirty="0"/>
+              <a:t>检测</a:t>
+            </a:r>
+            <a:r>
+              <a:rPr lang="zh-CN" altLang="en-US" sz="2000" dirty="0" smtClean="0"/>
+              <a:t>指标以及年龄，性别</a:t>
+            </a:r>
+            <a:endParaRPr lang="en-US" altLang="zh-CN" sz="2000" dirty="0" smtClean="0"/>
+          </a:p>
+          <a:p>
+            <a:r>
+              <a:rPr lang="en-US" altLang="zh-CN" sz="2000" dirty="0" smtClean="0"/>
+              <a:t>Y</a:t>
+            </a:r>
+            <a:r>
+              <a:rPr lang="zh-CN" altLang="en-US" sz="2000" dirty="0" smtClean="0"/>
+              <a:t>是该个体是否住院（典型的二分类问题）</a:t>
+            </a:r>
+            <a:endParaRPr lang="en-US" altLang="zh-CN" sz="2000" dirty="0" smtClean="0"/>
+          </a:p>
+          <a:p>
+            <a:r>
+              <a:rPr lang="en-US" altLang="zh-CN" sz="2000" dirty="0" smtClean="0"/>
+              <a:t>5-Fold cross-validation </a:t>
+            </a:r>
+            <a:r>
+              <a:rPr lang="en-US" altLang="zh-CN" sz="2000" dirty="0" err="1" smtClean="0"/>
+              <a:t>auc</a:t>
+            </a:r>
+            <a:r>
+              <a:rPr lang="en-US" altLang="zh-CN" sz="2000" dirty="0" smtClean="0"/>
+              <a:t>=0.819</a:t>
+            </a:r>
+            <a:r>
+              <a:rPr lang="zh-CN" altLang="en-US" sz="1200" dirty="0" smtClean="0"/>
+              <a:t>，</a:t>
+            </a:r>
+            <a:endParaRPr lang="zh-CN" altLang="en-US" sz="1200" dirty="0"/>
+          </a:p>
+        </p:txBody>
+      </p:sp>
+    </p:spTree>
+    <p:extLst>
+      <p:ext uri="{BB962C8B-B14F-4D97-AF65-F5344CB8AC3E}">
+        <p14:creationId xmlns:p14="http://schemas.microsoft.com/office/powerpoint/2010/main" val="1576938849"/>
+      </p:ext>
+    </p:extLst>
+  </p:cSld>
+  <p:clrMapOvr>
+    <a:masterClrMapping/>
+  </p:clrMapOvr>
+</p:sld>
+</file>
+
+<file path=ppt/slides/slide7.xml><?xml version="1.0" encoding="utf-8"?>
+<p:sld xmlns:a="http://schemas.openxmlformats.org/drawingml/2006/main" xmlns:r="http://schemas.openxmlformats.org/officeDocument/2006/relationships" xmlns:p="http://schemas.openxmlformats.org/presentationml/2006/main">
+  <p:cSld>
+    <p:spTree>
+      <p:nvGrpSpPr>
+        <p:cNvPr id="1" name=""/>
+        <p:cNvGrpSpPr/>
+        <p:nvPr/>
+      </p:nvGrpSpPr>
+      <p:grpSpPr>
+        <a:xfrm>
+          <a:off x="0" y="0"/>
+          <a:ext cx="0" cy="0"/>
+          <a:chOff x="0" y="0"/>
+          <a:chExt cx="0" cy="0"/>
+        </a:xfrm>
+      </p:grpSpPr>
+      <p:sp>
+        <p:nvSpPr>
           <p:cNvPr id="3" name="标题 2">
             <a:extLst>
               <a:ext uri="{FF2B5EF4-FFF2-40B4-BE49-F238E27FC236}">
-                <a16:creationId xmlns:a16="http://schemas.microsoft.com/office/drawing/2014/main" xmlns="" id="{04E56E47-0720-4C6A-95BF-471A0E082CCE}"/>
+                <a16:creationId xmlns="" xmlns:a16="http://schemas.microsoft.com/office/drawing/2014/main" id="{04E56E47-0720-4C6A-95BF-471A0E082CCE}"/>
               </a:ext>
             </a:extLst>
           </p:cNvPr>
@@ -5848,7 +6435,7 @@
           <p:cNvPr id="7" name="图片 6">
             <a:extLst>
               <a:ext uri="{FF2B5EF4-FFF2-40B4-BE49-F238E27FC236}">
-                <a16:creationId xmlns:a16="http://schemas.microsoft.com/office/drawing/2014/main" xmlns="" id="{2A28C6F1-80D5-4919-A8E9-F42EF13553FD}"/>
+                <a16:creationId xmlns="" xmlns:a16="http://schemas.microsoft.com/office/drawing/2014/main" id="{2A28C6F1-80D5-4919-A8E9-F42EF13553FD}"/>
               </a:ext>
             </a:extLst>
           </p:cNvPr>
@@ -5878,7 +6465,7 @@
           <p:cNvPr id="2" name="矩形 1">
             <a:extLst>
               <a:ext uri="{FF2B5EF4-FFF2-40B4-BE49-F238E27FC236}">
-                <a16:creationId xmlns:a16="http://schemas.microsoft.com/office/drawing/2014/main" xmlns="" id="{CEDECA9F-8B31-4840-B0EF-FB7FC1C5AA9A}"/>
+                <a16:creationId xmlns="" xmlns:a16="http://schemas.microsoft.com/office/drawing/2014/main" id="{CEDECA9F-8B31-4840-B0EF-FB7FC1C5AA9A}"/>
               </a:ext>
             </a:extLst>
           </p:cNvPr>
@@ -6048,7 +6635,7 @@
 </p:sld>
 </file>
 
-<file path=ppt/slides/slide7.xml><?xml version="1.0" encoding="utf-8"?>
+<file path=ppt/slides/slide8.xml><?xml version="1.0" encoding="utf-8"?>
 <p:sld xmlns:a="http://schemas.openxmlformats.org/drawingml/2006/main" xmlns:r="http://schemas.openxmlformats.org/officeDocument/2006/relationships" xmlns:p="http://schemas.openxmlformats.org/presentationml/2006/main">
   <p:cSld>
     <p:spTree>
@@ -6070,7 +6657,7 @@
           <p:cNvPr id="3" name="标题 2">
             <a:extLst>
               <a:ext uri="{FF2B5EF4-FFF2-40B4-BE49-F238E27FC236}">
-                <a16:creationId xmlns:a16="http://schemas.microsoft.com/office/drawing/2014/main" xmlns="" id="{04E56E47-0720-4C6A-95BF-471A0E082CCE}"/>
+                <a16:creationId xmlns="" xmlns:a16="http://schemas.microsoft.com/office/drawing/2014/main" id="{04E56E47-0720-4C6A-95BF-471A0E082CCE}"/>
               </a:ext>
             </a:extLst>
           </p:cNvPr>
@@ -6098,15 +6685,7 @@
             </a:r>
             <a:r>
               <a:rPr lang="zh-CN" altLang="en-US" sz="3200" dirty="0" smtClean="0"/>
-              <a:t>（基于</a:t>
-            </a:r>
-            <a:r>
-              <a:rPr lang="zh-CN" altLang="en-US" sz="3200" dirty="0" smtClean="0"/>
-              <a:t>二阶泛函的</a:t>
-            </a:r>
-            <a:r>
-              <a:rPr lang="zh-CN" altLang="en-US" sz="3200" dirty="0" smtClean="0"/>
-              <a:t>推导）</a:t>
+              <a:t>（基于二阶泛函的推导）</a:t>
             </a:r>
             <a:r>
               <a:rPr lang="en-US" altLang="zh-CN" sz="3200" dirty="0"/>
@@ -6130,7 +6709,7 @@
               <p:cNvPr id="4" name="矩形 3">
                 <a:extLst>
                   <a:ext uri="{FF2B5EF4-FFF2-40B4-BE49-F238E27FC236}">
-                    <a16:creationId xmlns:a16="http://schemas.microsoft.com/office/drawing/2014/main" xmlns="" id="{FF448FC5-6845-44CF-8DCE-CE493A9ACA31}"/>
+                    <a16:creationId xmlns="" xmlns:a16="http://schemas.microsoft.com/office/drawing/2014/main" id="{FF448FC5-6845-44CF-8DCE-CE493A9ACA31}"/>
                   </a:ext>
                 </a:extLst>
               </p:cNvPr>
@@ -6669,7 +7248,7 @@
               <p:cNvPr id="8" name="矩形 7">
                 <a:extLst>
                   <a:ext uri="{FF2B5EF4-FFF2-40B4-BE49-F238E27FC236}">
-                    <a16:creationId xmlns:a16="http://schemas.microsoft.com/office/drawing/2014/main" xmlns="" id="{03A907D2-D303-4944-8621-13AC80DF048D}"/>
+                    <a16:creationId xmlns="" xmlns:a16="http://schemas.microsoft.com/office/drawing/2014/main" id="{03A907D2-D303-4944-8621-13AC80DF048D}"/>
                   </a:ext>
                 </a:extLst>
               </p:cNvPr>
@@ -7323,7 +7902,7 @@
               <p:cNvPr id="10" name="矩形 9">
                 <a:extLst>
                   <a:ext uri="{FF2B5EF4-FFF2-40B4-BE49-F238E27FC236}">
-                    <a16:creationId xmlns:a16="http://schemas.microsoft.com/office/drawing/2014/main" xmlns="" id="{BBBB5130-C746-4CB2-AD93-FA77CB20804A}"/>
+                    <a16:creationId xmlns="" xmlns:a16="http://schemas.microsoft.com/office/drawing/2014/main" id="{BBBB5130-C746-4CB2-AD93-FA77CB20804A}"/>
                   </a:ext>
                 </a:extLst>
               </p:cNvPr>
@@ -10453,7 +11032,7 @@
           <p:cNvPr id="6" name="图片 5">
             <a:extLst>
               <a:ext uri="{FF2B5EF4-FFF2-40B4-BE49-F238E27FC236}">
-                <a16:creationId xmlns:a16="http://schemas.microsoft.com/office/drawing/2014/main" xmlns="" id="{CEA90293-23A9-4009-9BF1-436035769AFF}"/>
+                <a16:creationId xmlns="" xmlns:a16="http://schemas.microsoft.com/office/drawing/2014/main" id="{CEA90293-23A9-4009-9BF1-436035769AFF}"/>
               </a:ext>
             </a:extLst>
           </p:cNvPr>
@@ -10483,7 +11062,7 @@
           <p:cNvPr id="7" name="图片 6">
             <a:extLst>
               <a:ext uri="{FF2B5EF4-FFF2-40B4-BE49-F238E27FC236}">
-                <a16:creationId xmlns:a16="http://schemas.microsoft.com/office/drawing/2014/main" xmlns="" id="{166DF2AE-1799-494D-8C93-51379360F3DB}"/>
+                <a16:creationId xmlns="" xmlns:a16="http://schemas.microsoft.com/office/drawing/2014/main" id="{166DF2AE-1799-494D-8C93-51379360F3DB}"/>
               </a:ext>
             </a:extLst>
           </p:cNvPr>
@@ -10513,7 +11092,7 @@
           <p:cNvPr id="9" name="图片 8">
             <a:extLst>
               <a:ext uri="{FF2B5EF4-FFF2-40B4-BE49-F238E27FC236}">
-                <a16:creationId xmlns:a16="http://schemas.microsoft.com/office/drawing/2014/main" xmlns="" id="{1F777EAB-CC7E-478F-9AD1-0E17A84B8A13}"/>
+                <a16:creationId xmlns="" xmlns:a16="http://schemas.microsoft.com/office/drawing/2014/main" id="{1F777EAB-CC7E-478F-9AD1-0E17A84B8A13}"/>
               </a:ext>
             </a:extLst>
           </p:cNvPr>
@@ -10551,7 +11130,7 @@
 </p:sld>
 </file>
 
-<file path=ppt/slides/slide8.xml><?xml version="1.0" encoding="utf-8"?>
+<file path=ppt/slides/slide9.xml><?xml version="1.0" encoding="utf-8"?>
 <p:sld xmlns:a="http://schemas.openxmlformats.org/drawingml/2006/main" xmlns:r="http://schemas.openxmlformats.org/officeDocument/2006/relationships" xmlns:p="http://schemas.openxmlformats.org/presentationml/2006/main">
   <p:cSld>
     <p:spTree>
@@ -10573,7 +11152,7 @@
           <p:cNvPr id="3" name="标题 2">
             <a:extLst>
               <a:ext uri="{FF2B5EF4-FFF2-40B4-BE49-F238E27FC236}">
-                <a16:creationId xmlns:a16="http://schemas.microsoft.com/office/drawing/2014/main" xmlns="" id="{EBF8B4A5-98DF-4363-B020-836C55A63844}"/>
+                <a16:creationId xmlns="" xmlns:a16="http://schemas.microsoft.com/office/drawing/2014/main" id="{EBF8B4A5-98DF-4363-B020-836C55A63844}"/>
               </a:ext>
             </a:extLst>
           </p:cNvPr>
@@ -10618,7 +11197,7 @@
           <p:cNvPr id="4" name="灯片编号占位符 3">
             <a:extLst>
               <a:ext uri="{FF2B5EF4-FFF2-40B4-BE49-F238E27FC236}">
-                <a16:creationId xmlns:a16="http://schemas.microsoft.com/office/drawing/2014/main" xmlns="" id="{8F99CB2C-FCBF-4F69-8DFB-B9FE8F1F5227}"/>
+                <a16:creationId xmlns="" xmlns:a16="http://schemas.microsoft.com/office/drawing/2014/main" id="{8F99CB2C-FCBF-4F69-8DFB-B9FE8F1F5227}"/>
               </a:ext>
             </a:extLst>
           </p:cNvPr>
@@ -10645,7 +11224,7 @@
             <a:fld id="{341B1417-7C6B-406C-85A3-E980EC4DDF6C}" type="slidenum">
               <a:rPr lang="en-US" altLang="zh-CN" smtClean="0"/>
               <a:pPr/>
-              <a:t>8</a:t>
+              <a:t>9</a:t>
             </a:fld>
             <a:r>
               <a:rPr lang="zh-CN" altLang="en-US">
@@ -10668,7 +11247,7 @@
           <p:cNvPr id="7" name="矩形 6">
             <a:extLst>
               <a:ext uri="{FF2B5EF4-FFF2-40B4-BE49-F238E27FC236}">
-                <a16:creationId xmlns:a16="http://schemas.microsoft.com/office/drawing/2014/main" xmlns="" id="{06C24902-2F25-4117-8643-0B09B0AC91C4}"/>
+                <a16:creationId xmlns="" xmlns:a16="http://schemas.microsoft.com/office/drawing/2014/main" id="{06C24902-2F25-4117-8643-0B09B0AC91C4}"/>
               </a:ext>
             </a:extLst>
           </p:cNvPr>
@@ -10999,273 +11578,6 @@
     <p:extLst>
       <p:ext uri="{BB962C8B-B14F-4D97-AF65-F5344CB8AC3E}">
         <p14:creationId xmlns:p14="http://schemas.microsoft.com/office/powerpoint/2010/main" val="496772641"/>
-      </p:ext>
-    </p:extLst>
-  </p:cSld>
-  <p:clrMapOvr>
-    <a:masterClrMapping/>
-  </p:clrMapOvr>
-</p:sld>
-</file>
-
-<file path=ppt/slides/slide9.xml><?xml version="1.0" encoding="utf-8"?>
-<p:sld xmlns:a="http://schemas.openxmlformats.org/drawingml/2006/main" xmlns:r="http://schemas.openxmlformats.org/officeDocument/2006/relationships" xmlns:p="http://schemas.openxmlformats.org/presentationml/2006/main">
-  <p:cSld>
-    <p:spTree>
-      <p:nvGrpSpPr>
-        <p:cNvPr id="1" name=""/>
-        <p:cNvGrpSpPr/>
-        <p:nvPr/>
-      </p:nvGrpSpPr>
-      <p:grpSpPr>
-        <a:xfrm>
-          <a:off x="0" y="0"/>
-          <a:ext cx="0" cy="0"/>
-          <a:chOff x="0" y="0"/>
-          <a:chExt cx="0" cy="0"/>
-        </a:xfrm>
-      </p:grpSpPr>
-      <p:sp>
-        <p:nvSpPr>
-          <p:cNvPr id="3" name="标题 2">
-            <a:extLst>
-              <a:ext uri="{FF2B5EF4-FFF2-40B4-BE49-F238E27FC236}">
-                <a16:creationId xmlns:a16="http://schemas.microsoft.com/office/drawing/2014/main" xmlns="" id="{EBF8B4A5-98DF-4363-B020-836C55A63844}"/>
-              </a:ext>
-            </a:extLst>
-          </p:cNvPr>
-          <p:cNvSpPr>
-            <a:spLocks noGrp="1"/>
-          </p:cNvSpPr>
-          <p:nvPr>
-            <p:ph type="title"/>
-          </p:nvPr>
-        </p:nvSpPr>
-        <p:spPr>
-          <a:xfrm>
-            <a:off x="563033" y="329971"/>
-            <a:ext cx="10515600" cy="1325563"/>
-          </a:xfrm>
-        </p:spPr>
-        <p:txBody>
-          <a:bodyPr/>
-          <a:lstStyle/>
-          <a:p>
-            <a:r>
-              <a:rPr lang="en-US" altLang="zh-CN" dirty="0" smtClean="0"/>
-              <a:t>2.4 </a:t>
-            </a:r>
-            <a:r>
-              <a:rPr lang="zh-CN" altLang="en-US" dirty="0" smtClean="0"/>
-              <a:t>云平台</a:t>
-            </a:r>
-            <a:r>
-              <a:rPr lang="en-US" altLang="zh-CN" dirty="0" smtClean="0"/>
-              <a:t> </a:t>
-            </a:r>
-            <a:endParaRPr lang="zh-CN" altLang="en-US" dirty="0"/>
-          </a:p>
-        </p:txBody>
-      </p:sp>
-      <p:sp>
-        <p:nvSpPr>
-          <p:cNvPr id="4" name="灯片编号占位符 3">
-            <a:extLst>
-              <a:ext uri="{FF2B5EF4-FFF2-40B4-BE49-F238E27FC236}">
-                <a16:creationId xmlns:a16="http://schemas.microsoft.com/office/drawing/2014/main" xmlns="" id="{8F99CB2C-FCBF-4F69-8DFB-B9FE8F1F5227}"/>
-              </a:ext>
-            </a:extLst>
-          </p:cNvPr>
-          <p:cNvSpPr>
-            <a:spLocks noGrp="1"/>
-          </p:cNvSpPr>
-          <p:nvPr>
-            <p:ph type="sldNum" sz="quarter" idx="12"/>
-          </p:nvPr>
-        </p:nvSpPr>
-        <p:spPr/>
-        <p:txBody>
-          <a:bodyPr/>
-          <a:lstStyle/>
-          <a:p>
-            <a:r>
-              <a:rPr lang="zh-CN" altLang="en-US">
-                <a:solidFill>
-                  <a:srgbClr val="898989"/>
-                </a:solidFill>
-              </a:rPr>
-              <a:t>第</a:t>
-            </a:r>
-            <a:fld id="{341B1417-7C6B-406C-85A3-E980EC4DDF6C}" type="slidenum">
-              <a:rPr lang="en-US" altLang="zh-CN" smtClean="0"/>
-              <a:pPr/>
-              <a:t>9</a:t>
-            </a:fld>
-            <a:r>
-              <a:rPr lang="zh-CN" altLang="en-US">
-                <a:solidFill>
-                  <a:srgbClr val="898989"/>
-                </a:solidFill>
-              </a:rPr>
-              <a:t>页</a:t>
-            </a:r>
-            <a:endParaRPr lang="zh-CN" altLang="en-US" dirty="0">
-              <a:solidFill>
-                <a:srgbClr val="898989"/>
-              </a:solidFill>
-            </a:endParaRPr>
-          </a:p>
-        </p:txBody>
-      </p:sp>
-      <p:sp>
-        <p:nvSpPr>
-          <p:cNvPr id="10" name="矩形 9">
-            <a:extLst>
-              <a:ext uri="{FF2B5EF4-FFF2-40B4-BE49-F238E27FC236}">
-                <a16:creationId xmlns:a16="http://schemas.microsoft.com/office/drawing/2014/main" xmlns="" id="{06C24902-2F25-4117-8643-0B09B0AC91C4}"/>
-              </a:ext>
-            </a:extLst>
-          </p:cNvPr>
-          <p:cNvSpPr/>
-          <p:nvPr/>
-        </p:nvSpPr>
-        <p:spPr>
-          <a:xfrm>
-            <a:off x="2179734" y="5987018"/>
-            <a:ext cx="8322733" cy="369332"/>
-          </a:xfrm>
-          <a:prstGeom prst="rect">
-            <a:avLst/>
-          </a:prstGeom>
-        </p:spPr>
-        <p:txBody>
-          <a:bodyPr wrap="square">
-            <a:spAutoFit/>
-          </a:bodyPr>
-          <a:lstStyle/>
-          <a:p>
-            <a:r>
-              <a:rPr lang="zh-CN" altLang="en-US" dirty="0" smtClean="0"/>
-              <a:t>注：需要适当修改该图片。</a:t>
-            </a:r>
-            <a:endParaRPr lang="en-US" altLang="zh-CN" dirty="0" smtClean="0"/>
-          </a:p>
-        </p:txBody>
-      </p:sp>
-      <p:pic>
-        <p:nvPicPr>
-          <p:cNvPr id="2052" name="Picture 4" descr="https://timgsa.baidu.com/timg?image&amp;quality=80&amp;size=b9999_10000&amp;sec=1561727415964&amp;di=21a832ade8d0bfa250bbafe733106ae9&amp;imgtype=0&amp;src=http%3A%2F%2Fimg.mp.itc.cn%2Fupload%2F20160812%2F7da7bd360b754886b20e53d10f2804ac_th.jpeg"/>
-          <p:cNvPicPr>
-            <a:picLocks noChangeAspect="1" noChangeArrowheads="1"/>
-          </p:cNvPicPr>
-          <p:nvPr/>
-        </p:nvPicPr>
-        <p:blipFill>
-          <a:blip r:embed="rId2">
-            <a:extLst>
-              <a:ext uri="{28A0092B-C50C-407E-A947-70E740481C1C}">
-                <a14:useLocalDpi xmlns:a14="http://schemas.microsoft.com/office/drawing/2010/main" val="0"/>
-              </a:ext>
-            </a:extLst>
-          </a:blip>
-          <a:srcRect/>
-          <a:stretch>
-            <a:fillRect/>
-          </a:stretch>
-        </p:blipFill>
-        <p:spPr bwMode="auto">
-          <a:xfrm>
-            <a:off x="2488556" y="2650635"/>
-            <a:ext cx="5381263" cy="3336383"/>
-          </a:xfrm>
-          <a:prstGeom prst="rect">
-            <a:avLst/>
-          </a:prstGeom>
-          <a:noFill/>
-          <a:extLst>
-            <a:ext uri="{909E8E84-426E-40DD-AFC4-6F175D3DCCD1}">
-              <a14:hiddenFill xmlns:a14="http://schemas.microsoft.com/office/drawing/2010/main">
-                <a:solidFill>
-                  <a:srgbClr val="FFFFFF"/>
-                </a:solidFill>
-              </a14:hiddenFill>
-            </a:ext>
-          </a:extLst>
-        </p:spPr>
-      </p:pic>
-      <p:sp>
-        <p:nvSpPr>
-          <p:cNvPr id="13" name="矩形 12">
-            <a:extLst>
-              <a:ext uri="{FF2B5EF4-FFF2-40B4-BE49-F238E27FC236}">
-                <a16:creationId xmlns:a16="http://schemas.microsoft.com/office/drawing/2014/main" xmlns="" id="{06C24902-2F25-4117-8643-0B09B0AC91C4}"/>
-              </a:ext>
-            </a:extLst>
-          </p:cNvPr>
-          <p:cNvSpPr/>
-          <p:nvPr/>
-        </p:nvSpPr>
-        <p:spPr>
-          <a:xfrm>
-            <a:off x="1659467" y="1616663"/>
-            <a:ext cx="8322733" cy="923330"/>
-          </a:xfrm>
-          <a:prstGeom prst="rect">
-            <a:avLst/>
-          </a:prstGeom>
-        </p:spPr>
-        <p:txBody>
-          <a:bodyPr wrap="square">
-            <a:spAutoFit/>
-          </a:bodyPr>
-          <a:lstStyle/>
-          <a:p>
-            <a:r>
-              <a:rPr lang="en-US" altLang="zh-CN" dirty="0" smtClean="0"/>
-              <a:t>1 </a:t>
-            </a:r>
-            <a:r>
-              <a:rPr lang="zh-CN" altLang="en-US" dirty="0" smtClean="0"/>
-              <a:t>客户端（</a:t>
-            </a:r>
-            <a:r>
-              <a:rPr lang="en-US" altLang="zh-CN" dirty="0" smtClean="0"/>
-              <a:t>APP,</a:t>
-            </a:r>
-            <a:r>
-              <a:rPr lang="zh-CN" altLang="en-US" dirty="0" smtClean="0"/>
-              <a:t>检测设备等）采集数据直接发送给云平台</a:t>
-            </a:r>
-            <a:endParaRPr lang="en-US" altLang="zh-CN" dirty="0" smtClean="0"/>
-          </a:p>
-          <a:p>
-            <a:r>
-              <a:rPr lang="en-US" altLang="zh-CN" dirty="0" smtClean="0"/>
-              <a:t>2 </a:t>
-            </a:r>
-            <a:r>
-              <a:rPr lang="zh-CN" altLang="en-US" dirty="0" smtClean="0"/>
-              <a:t>云平台分析该数据，得到结果。发送给客户端</a:t>
-            </a:r>
-            <a:endParaRPr lang="en-US" altLang="zh-CN" dirty="0" smtClean="0"/>
-          </a:p>
-          <a:p>
-            <a:r>
-              <a:rPr lang="en-US" altLang="zh-CN" dirty="0" smtClean="0"/>
-              <a:t>3 </a:t>
-            </a:r>
-            <a:r>
-              <a:rPr lang="zh-CN" altLang="en-US" dirty="0" smtClean="0"/>
-              <a:t>客户端展示该结果</a:t>
-            </a:r>
-            <a:endParaRPr lang="en-US" altLang="zh-CN" dirty="0" smtClean="0"/>
-          </a:p>
-        </p:txBody>
-      </p:sp>
-    </p:spTree>
-    <p:extLst>
-      <p:ext uri="{BB962C8B-B14F-4D97-AF65-F5344CB8AC3E}">
-        <p14:creationId xmlns:p14="http://schemas.microsoft.com/office/powerpoint/2010/main" val="1148724376"/>
       </p:ext>
     </p:extLst>
   </p:cSld>

</xml_diff>